<commit_message>
updated ppt and mdf
</commit_message>
<xml_diff>
--- a/OData.pptx
+++ b/OData.pptx
@@ -262,7 +262,7 @@
           <a:p>
             <a:fld id="{34A25F1C-2E24-4262-BB7F-88FFAEC36839}" type="datetimeFigureOut">
               <a:rPr lang="en-US" smtClean="0"/>
-              <a:t>12/27/2015</a:t>
+              <a:t>12/29/2015</a:t>
             </a:fld>
             <a:endParaRPr lang="en-US"/>
           </a:p>
@@ -432,7 +432,7 @@
           <a:p>
             <a:fld id="{34A25F1C-2E24-4262-BB7F-88FFAEC36839}" type="datetimeFigureOut">
               <a:rPr lang="en-US" smtClean="0"/>
-              <a:t>12/27/2015</a:t>
+              <a:t>12/29/2015</a:t>
             </a:fld>
             <a:endParaRPr lang="en-US"/>
           </a:p>
@@ -612,7 +612,7 @@
           <a:p>
             <a:fld id="{34A25F1C-2E24-4262-BB7F-88FFAEC36839}" type="datetimeFigureOut">
               <a:rPr lang="en-US" smtClean="0"/>
-              <a:t>12/27/2015</a:t>
+              <a:t>12/29/2015</a:t>
             </a:fld>
             <a:endParaRPr lang="en-US"/>
           </a:p>
@@ -782,7 +782,7 @@
           <a:p>
             <a:fld id="{34A25F1C-2E24-4262-BB7F-88FFAEC36839}" type="datetimeFigureOut">
               <a:rPr lang="en-US" smtClean="0"/>
-              <a:t>12/27/2015</a:t>
+              <a:t>12/29/2015</a:t>
             </a:fld>
             <a:endParaRPr lang="en-US"/>
           </a:p>
@@ -1028,7 +1028,7 @@
           <a:p>
             <a:fld id="{34A25F1C-2E24-4262-BB7F-88FFAEC36839}" type="datetimeFigureOut">
               <a:rPr lang="en-US" smtClean="0"/>
-              <a:t>12/27/2015</a:t>
+              <a:t>12/29/2015</a:t>
             </a:fld>
             <a:endParaRPr lang="en-US"/>
           </a:p>
@@ -1260,7 +1260,7 @@
           <a:p>
             <a:fld id="{34A25F1C-2E24-4262-BB7F-88FFAEC36839}" type="datetimeFigureOut">
               <a:rPr lang="en-US" smtClean="0"/>
-              <a:t>12/27/2015</a:t>
+              <a:t>12/29/2015</a:t>
             </a:fld>
             <a:endParaRPr lang="en-US"/>
           </a:p>
@@ -1627,7 +1627,7 @@
           <a:p>
             <a:fld id="{34A25F1C-2E24-4262-BB7F-88FFAEC36839}" type="datetimeFigureOut">
               <a:rPr lang="en-US" smtClean="0"/>
-              <a:t>12/27/2015</a:t>
+              <a:t>12/29/2015</a:t>
             </a:fld>
             <a:endParaRPr lang="en-US"/>
           </a:p>
@@ -1745,7 +1745,7 @@
           <a:p>
             <a:fld id="{34A25F1C-2E24-4262-BB7F-88FFAEC36839}" type="datetimeFigureOut">
               <a:rPr lang="en-US" smtClean="0"/>
-              <a:t>12/27/2015</a:t>
+              <a:t>12/29/2015</a:t>
             </a:fld>
             <a:endParaRPr lang="en-US"/>
           </a:p>
@@ -1840,7 +1840,7 @@
           <a:p>
             <a:fld id="{34A25F1C-2E24-4262-BB7F-88FFAEC36839}" type="datetimeFigureOut">
               <a:rPr lang="en-US" smtClean="0"/>
-              <a:t>12/27/2015</a:t>
+              <a:t>12/29/2015</a:t>
             </a:fld>
             <a:endParaRPr lang="en-US"/>
           </a:p>
@@ -2117,7 +2117,7 @@
           <a:p>
             <a:fld id="{34A25F1C-2E24-4262-BB7F-88FFAEC36839}" type="datetimeFigureOut">
               <a:rPr lang="en-US" smtClean="0"/>
-              <a:t>12/27/2015</a:t>
+              <a:t>12/29/2015</a:t>
             </a:fld>
             <a:endParaRPr lang="en-US"/>
           </a:p>
@@ -2370,7 +2370,7 @@
           <a:p>
             <a:fld id="{34A25F1C-2E24-4262-BB7F-88FFAEC36839}" type="datetimeFigureOut">
               <a:rPr lang="en-US" smtClean="0"/>
-              <a:t>12/27/2015</a:t>
+              <a:t>12/29/2015</a:t>
             </a:fld>
             <a:endParaRPr lang="en-US"/>
           </a:p>
@@ -2583,7 +2583,7 @@
           <a:p>
             <a:fld id="{34A25F1C-2E24-4262-BB7F-88FFAEC36839}" type="datetimeFigureOut">
               <a:rPr lang="en-US" smtClean="0"/>
-              <a:t>12/27/2015</a:t>
+              <a:t>12/29/2015</a:t>
             </a:fld>
             <a:endParaRPr lang="en-US"/>
           </a:p>
@@ -3066,7 +3066,7 @@
         </p:blipFill>
         <p:spPr bwMode="auto">
           <a:xfrm>
-            <a:off x="4437911" y="1562624"/>
+            <a:off x="4601684" y="1640619"/>
             <a:ext cx="6448454" cy="3782451"/>
           </a:xfrm>
           <a:prstGeom prst="rect">
@@ -3092,7 +3092,7 @@
         </p:nvSpPr>
         <p:spPr>
           <a:xfrm>
-            <a:off x="1683224" y="4267858"/>
+            <a:off x="1683224" y="4345852"/>
             <a:ext cx="3489277" cy="1077218"/>
           </a:xfrm>
           <a:prstGeom prst="rect">
@@ -3155,18 +3155,7 @@
                 <a:ea typeface="Times New Roman" pitchFamily="18"/>
                 <a:cs typeface="Times New Roman" pitchFamily="18"/>
               </a:rPr>
-              <a:t>Team </a:t>
-            </a:r>
-            <a:r>
-              <a:rPr lang="en-US" sz="3200" dirty="0" smtClean="0">
-                <a:solidFill>
-                  <a:srgbClr val="0070C0"/>
-                </a:solidFill>
-                <a:latin typeface="Centaur" panose="02030504050205020304" pitchFamily="18" charset="0"/>
-                <a:ea typeface="Times New Roman" pitchFamily="18"/>
-                <a:cs typeface="Times New Roman" pitchFamily="18"/>
-              </a:rPr>
-              <a:t>Banana</a:t>
+              <a:t>Team Banana</a:t>
             </a:r>
             <a:endParaRPr lang="en-US" sz="3200" dirty="0">
               <a:solidFill>
@@ -3267,76 +3256,661 @@
       </p:sp>
       <p:pic>
         <p:nvPicPr>
-          <p:cNvPr id="4" name="Picture 3"/>
+          <p:cNvPr id="6" name="Picture 2" descr="https://s-media-cache-ak0.pinimg.com/736x/58/df/35/58df3549ac4993bc85b985d37e5b3e24.jpg"/>
+          <p:cNvPicPr>
+            <a:picLocks noChangeAspect="1" noChangeArrowheads="1"/>
+          </p:cNvPicPr>
+          <p:nvPr/>
+        </p:nvPicPr>
+        <p:blipFill>
+          <a:blip r:embed="rId2" cstate="print">
+            <a:extLst>
+              <a:ext uri="{28A0092B-C50C-407E-A947-70E740481C1C}">
+                <a14:useLocalDpi xmlns:a14="http://schemas.microsoft.com/office/drawing/2010/main" val="0"/>
+              </a:ext>
+            </a:extLst>
+          </a:blip>
+          <a:srcRect/>
+          <a:stretch>
+            <a:fillRect/>
+          </a:stretch>
+        </p:blipFill>
+        <p:spPr bwMode="auto">
+          <a:xfrm>
+            <a:off x="9853684" y="365125"/>
+            <a:ext cx="1774210" cy="1685018"/>
+          </a:xfrm>
+          <a:prstGeom prst="rect">
+            <a:avLst/>
+          </a:prstGeom>
+          <a:noFill/>
+          <a:extLst>
+            <a:ext uri="{909E8E84-426E-40DD-AFC4-6F175D3DCCD1}">
+              <a14:hiddenFill xmlns:a14="http://schemas.microsoft.com/office/drawing/2010/main">
+                <a:solidFill>
+                  <a:srgbClr val="FFFFFF"/>
+                </a:solidFill>
+              </a14:hiddenFill>
+            </a:ext>
+          </a:extLst>
+        </p:spPr>
+      </p:pic>
+      <p:pic>
+        <p:nvPicPr>
+          <p:cNvPr id="10" name="Picture 9"/>
           <p:cNvPicPr>
             <a:picLocks noChangeAspect="1"/>
           </p:cNvPicPr>
           <p:nvPr/>
         </p:nvPicPr>
         <p:blipFill>
-          <a:blip r:embed="rId2">
-            <a:lum bright="-50000"/>
-            <a:alphaModFix/>
-          </a:blip>
-          <a:srcRect/>
+          <a:blip r:embed="rId3"/>
           <a:stretch>
             <a:fillRect/>
           </a:stretch>
         </p:blipFill>
         <p:spPr>
           <a:xfrm>
-            <a:off x="988737" y="1690688"/>
-            <a:ext cx="7238880" cy="1209600"/>
+            <a:off x="988737" y="1844105"/>
+            <a:ext cx="8168586" cy="967333"/>
           </a:xfrm>
           <a:prstGeom prst="rect">
             <a:avLst/>
           </a:prstGeom>
-          <a:noFill/>
-          <a:ln>
-            <a:noFill/>
-          </a:ln>
         </p:spPr>
       </p:pic>
-      <p:pic>
-        <p:nvPicPr>
-          <p:cNvPr id="5" name="Picture 4"/>
-          <p:cNvPicPr>
-            <a:picLocks noChangeAspect="1"/>
-          </p:cNvPicPr>
-          <p:nvPr/>
-        </p:nvPicPr>
-        <p:blipFill>
-          <a:blip r:embed="rId3">
-            <a:lum bright="-50000"/>
-            <a:alphaModFix/>
-          </a:blip>
-          <a:srcRect/>
-          <a:stretch>
-            <a:fillRect/>
-          </a:stretch>
-        </p:blipFill>
-        <p:spPr>
-          <a:xfrm>
-            <a:off x="988737" y="2959324"/>
-            <a:ext cx="7623000" cy="3693959"/>
-          </a:xfrm>
-          <a:prstGeom prst="rect">
-            <a:avLst/>
-          </a:prstGeom>
-          <a:solidFill>
-            <a:schemeClr val="accent1"/>
-          </a:solidFill>
-          <a:ln>
-            <a:noFill/>
-          </a:ln>
-          <a:effectLst>
-            <a:outerShdw blurRad="50800" dist="50800" dir="5400000" algn="ctr" rotWithShape="0">
-              <a:srgbClr val="000000"/>
-            </a:outerShdw>
-            <a:softEdge rad="0"/>
-          </a:effectLst>
-        </p:spPr>
-      </p:pic>
+      <p:graphicFrame>
+        <p:nvGraphicFramePr>
+          <p:cNvPr id="11" name="Table 10"/>
+          <p:cNvGraphicFramePr>
+            <a:graphicFrameLocks noGrp="1"/>
+          </p:cNvGraphicFramePr>
+          <p:nvPr>
+            <p:extLst>
+              <p:ext uri="{D42A27DB-BD31-4B8C-83A1-F6EECF244321}">
+                <p14:modId xmlns:p14="http://schemas.microsoft.com/office/powerpoint/2010/main" val="3721343072"/>
+              </p:ext>
+            </p:extLst>
+          </p:nvPr>
+        </p:nvGraphicFramePr>
+        <p:xfrm>
+          <a:off x="1050151" y="3176263"/>
+          <a:ext cx="8045757" cy="2869696"/>
+        </p:xfrm>
+        <a:graphic>
+          <a:graphicData uri="http://schemas.openxmlformats.org/drawingml/2006/table">
+            <a:tbl>
+              <a:tblPr firstRow="1" bandRow="1">
+                <a:tableStyleId>{5C22544A-7EE6-4342-B048-85BDC9FD1C3A}</a:tableStyleId>
+              </a:tblPr>
+              <a:tblGrid>
+                <a:gridCol w="2005249"/>
+                <a:gridCol w="3047962"/>
+                <a:gridCol w="2992546"/>
+              </a:tblGrid>
+              <a:tr h="353137">
+                <a:tc>
+                  <a:txBody>
+                    <a:bodyPr/>
+                    <a:lstStyle/>
+                    <a:p>
+                      <a:pPr algn="ctr" rtl="0" fontAlgn="b"/>
+                      <a:r>
+                        <a:rPr lang="en-US" sz="1800" b="1" i="0" u="none" strike="noStrike" dirty="0">
+                          <a:solidFill>
+                            <a:srgbClr val="1F497D"/>
+                          </a:solidFill>
+                          <a:effectLst/>
+                          <a:latin typeface="Calibri" panose="020F0502020204030204" pitchFamily="34" charset="0"/>
+                        </a:rPr>
+                        <a:t>Option</a:t>
+                      </a:r>
+                    </a:p>
+                  </a:txBody>
+                  <a:tcPr marL="9525" marR="9525" marT="9525" marB="0" anchor="ctr"/>
+                </a:tc>
+                <a:tc>
+                  <a:txBody>
+                    <a:bodyPr/>
+                    <a:lstStyle/>
+                    <a:p>
+                      <a:pPr algn="ctr" rtl="0" fontAlgn="b"/>
+                      <a:r>
+                        <a:rPr lang="en-US" sz="1800" b="1" i="0" u="none" strike="noStrike" dirty="0">
+                          <a:solidFill>
+                            <a:srgbClr val="1F497D"/>
+                          </a:solidFill>
+                          <a:effectLst/>
+                          <a:latin typeface="Calibri" panose="020F0502020204030204" pitchFamily="34" charset="0"/>
+                        </a:rPr>
+                        <a:t>Description</a:t>
+                      </a:r>
+                    </a:p>
+                  </a:txBody>
+                  <a:tcPr marL="9525" marR="9525" marT="9525" marB="0" anchor="ctr"/>
+                </a:tc>
+                <a:tc>
+                  <a:txBody>
+                    <a:bodyPr/>
+                    <a:lstStyle/>
+                    <a:p>
+                      <a:pPr algn="ctr" rtl="0" fontAlgn="b"/>
+                      <a:r>
+                        <a:rPr lang="en-US" sz="1800" b="1" i="0" u="none" strike="noStrike" dirty="0">
+                          <a:solidFill>
+                            <a:srgbClr val="1F497D"/>
+                          </a:solidFill>
+                          <a:effectLst/>
+                          <a:latin typeface="Calibri" panose="020F0502020204030204" pitchFamily="34" charset="0"/>
+                        </a:rPr>
+                        <a:t>Example</a:t>
+                      </a:r>
+                    </a:p>
+                  </a:txBody>
+                  <a:tcPr marL="9525" marR="9525" marT="9525" marB="0" anchor="ctr"/>
+                </a:tc>
+              </a:tr>
+              <a:tr h="353137">
+                <a:tc>
+                  <a:txBody>
+                    <a:bodyPr/>
+                    <a:lstStyle/>
+                    <a:p>
+                      <a:pPr algn="l" rtl="0" fontAlgn="b"/>
+                      <a:r>
+                        <a:rPr lang="en-US" sz="1600" b="1" i="0" u="none" strike="noStrike" dirty="0">
+                          <a:solidFill>
+                            <a:schemeClr val="bg2">
+                              <a:lumMod val="10000"/>
+                            </a:schemeClr>
+                          </a:solidFill>
+                          <a:effectLst/>
+                          <a:latin typeface="Calibri" panose="020F0502020204030204" pitchFamily="34" charset="0"/>
+                        </a:rPr>
+                        <a:t>$filter</a:t>
+                      </a:r>
+                    </a:p>
+                  </a:txBody>
+                  <a:tcPr marL="9525" marR="9525" marT="9525" marB="0" anchor="ctr"/>
+                </a:tc>
+                <a:tc>
+                  <a:txBody>
+                    <a:bodyPr/>
+                    <a:lstStyle/>
+                    <a:p>
+                      <a:pPr algn="l" rtl="0" fontAlgn="b"/>
+                      <a:r>
+                        <a:rPr lang="en-US" sz="1600" b="1" i="0" u="none" strike="noStrike">
+                          <a:solidFill>
+                            <a:schemeClr val="bg2">
+                              <a:lumMod val="10000"/>
+                            </a:schemeClr>
+                          </a:solidFill>
+                          <a:effectLst/>
+                          <a:latin typeface="Calibri" panose="020F0502020204030204" pitchFamily="34" charset="0"/>
+                        </a:rPr>
+                        <a:t>Filter the results</a:t>
+                      </a:r>
+                    </a:p>
+                  </a:txBody>
+                  <a:tcPr marL="9525" marR="9525" marT="9525" marB="0" anchor="ctr"/>
+                </a:tc>
+                <a:tc>
+                  <a:txBody>
+                    <a:bodyPr/>
+                    <a:lstStyle/>
+                    <a:p>
+                      <a:pPr algn="l" rtl="0" fontAlgn="b"/>
+                      <a:r>
+                        <a:rPr lang="en-US" sz="1600" b="1" i="0" u="none" strike="noStrike">
+                          <a:solidFill>
+                            <a:schemeClr val="bg2">
+                              <a:lumMod val="10000"/>
+                            </a:schemeClr>
+                          </a:solidFill>
+                          <a:effectLst/>
+                          <a:latin typeface="Calibri" panose="020F0502020204030204" pitchFamily="34" charset="0"/>
+                        </a:rPr>
+                        <a:t>/Products?$filter=Id gt 4</a:t>
+                      </a:r>
+                    </a:p>
+                  </a:txBody>
+                  <a:tcPr marL="9525" marR="9525" marT="9525" marB="0" anchor="ctr"/>
+                </a:tc>
+              </a:tr>
+              <a:tr h="280031">
+                <a:tc>
+                  <a:txBody>
+                    <a:bodyPr/>
+                    <a:lstStyle/>
+                    <a:p>
+                      <a:pPr algn="l" rtl="0" fontAlgn="b"/>
+                      <a:r>
+                        <a:rPr lang="en-US" sz="1600" b="1" i="0" u="none" strike="noStrike" dirty="0">
+                          <a:solidFill>
+                            <a:schemeClr val="bg2">
+                              <a:lumMod val="10000"/>
+                            </a:schemeClr>
+                          </a:solidFill>
+                          <a:effectLst/>
+                          <a:latin typeface="Calibri" panose="020F0502020204030204" pitchFamily="34" charset="0"/>
+                        </a:rPr>
+                        <a:t>$</a:t>
+                      </a:r>
+                      <a:r>
+                        <a:rPr lang="en-US" sz="1600" b="1" i="0" u="none" strike="noStrike" dirty="0" err="1">
+                          <a:solidFill>
+                            <a:schemeClr val="bg2">
+                              <a:lumMod val="10000"/>
+                            </a:schemeClr>
+                          </a:solidFill>
+                          <a:effectLst/>
+                          <a:latin typeface="Calibri" panose="020F0502020204030204" pitchFamily="34" charset="0"/>
+                        </a:rPr>
+                        <a:t>orderby</a:t>
+                      </a:r>
+                      <a:endParaRPr lang="en-US" sz="1600" b="1" i="0" u="none" strike="noStrike" dirty="0">
+                        <a:solidFill>
+                          <a:schemeClr val="bg2">
+                            <a:lumMod val="10000"/>
+                          </a:schemeClr>
+                        </a:solidFill>
+                        <a:effectLst/>
+                        <a:latin typeface="Calibri" panose="020F0502020204030204" pitchFamily="34" charset="0"/>
+                      </a:endParaRPr>
+                    </a:p>
+                  </a:txBody>
+                  <a:tcPr marL="9525" marR="9525" marT="9525" marB="0" anchor="ctr"/>
+                </a:tc>
+                <a:tc>
+                  <a:txBody>
+                    <a:bodyPr/>
+                    <a:lstStyle/>
+                    <a:p>
+                      <a:pPr algn="l" rtl="0" fontAlgn="b"/>
+                      <a:r>
+                        <a:rPr lang="en-US" sz="1600" b="1" i="0" u="none" strike="noStrike">
+                          <a:solidFill>
+                            <a:schemeClr val="bg2">
+                              <a:lumMod val="10000"/>
+                            </a:schemeClr>
+                          </a:solidFill>
+                          <a:effectLst/>
+                          <a:latin typeface="Calibri" panose="020F0502020204030204" pitchFamily="34" charset="0"/>
+                        </a:rPr>
+                        <a:t>Sort the results</a:t>
+                      </a:r>
+                    </a:p>
+                  </a:txBody>
+                  <a:tcPr marL="9525" marR="9525" marT="9525" marB="0" anchor="ctr"/>
+                </a:tc>
+                <a:tc>
+                  <a:txBody>
+                    <a:bodyPr/>
+                    <a:lstStyle/>
+                    <a:p>
+                      <a:pPr algn="l" rtl="0" fontAlgn="b"/>
+                      <a:r>
+                        <a:rPr lang="en-US" sz="1600" b="1" i="0" u="none" strike="noStrike">
+                          <a:solidFill>
+                            <a:schemeClr val="bg2">
+                              <a:lumMod val="10000"/>
+                            </a:schemeClr>
+                          </a:solidFill>
+                          <a:effectLst/>
+                          <a:latin typeface="Calibri" panose="020F0502020204030204" pitchFamily="34" charset="0"/>
+                        </a:rPr>
+                        <a:t>/Products?$orderby=Price desc</a:t>
+                      </a:r>
+                    </a:p>
+                  </a:txBody>
+                  <a:tcPr marL="9525" marR="9525" marT="9525" marB="0" anchor="ctr"/>
+                </a:tc>
+              </a:tr>
+              <a:tr h="353137">
+                <a:tc>
+                  <a:txBody>
+                    <a:bodyPr/>
+                    <a:lstStyle/>
+                    <a:p>
+                      <a:pPr algn="l" rtl="0" fontAlgn="b"/>
+                      <a:r>
+                        <a:rPr lang="en-US" sz="1600" b="1" i="0" u="none" strike="noStrike" dirty="0">
+                          <a:solidFill>
+                            <a:schemeClr val="bg2">
+                              <a:lumMod val="10000"/>
+                            </a:schemeClr>
+                          </a:solidFill>
+                          <a:effectLst/>
+                          <a:latin typeface="Calibri" panose="020F0502020204030204" pitchFamily="34" charset="0"/>
+                        </a:rPr>
+                        <a:t>$top</a:t>
+                      </a:r>
+                    </a:p>
+                  </a:txBody>
+                  <a:tcPr marL="9525" marR="9525" marT="9525" marB="0" anchor="ctr"/>
+                </a:tc>
+                <a:tc>
+                  <a:txBody>
+                    <a:bodyPr/>
+                    <a:lstStyle/>
+                    <a:p>
+                      <a:pPr algn="l" rtl="0" fontAlgn="b"/>
+                      <a:r>
+                        <a:rPr lang="en-US" sz="1600" b="1" i="0" u="none" strike="noStrike" dirty="0">
+                          <a:solidFill>
+                            <a:schemeClr val="bg2">
+                              <a:lumMod val="10000"/>
+                            </a:schemeClr>
+                          </a:solidFill>
+                          <a:effectLst/>
+                          <a:latin typeface="Calibri" panose="020F0502020204030204" pitchFamily="34" charset="0"/>
+                        </a:rPr>
+                        <a:t>Take first n results</a:t>
+                      </a:r>
+                    </a:p>
+                  </a:txBody>
+                  <a:tcPr marL="9525" marR="9525" marT="9525" marB="0" anchor="ctr"/>
+                </a:tc>
+                <a:tc>
+                  <a:txBody>
+                    <a:bodyPr/>
+                    <a:lstStyle/>
+                    <a:p>
+                      <a:pPr algn="l" rtl="0" fontAlgn="b"/>
+                      <a:r>
+                        <a:rPr lang="en-US" sz="1600" b="1" i="0" u="none" strike="noStrike">
+                          <a:solidFill>
+                            <a:schemeClr val="bg2">
+                              <a:lumMod val="10000"/>
+                            </a:schemeClr>
+                          </a:solidFill>
+                          <a:effectLst/>
+                          <a:latin typeface="Calibri" panose="020F0502020204030204" pitchFamily="34" charset="0"/>
+                        </a:rPr>
+                        <a:t>/Products?$top=2</a:t>
+                      </a:r>
+                    </a:p>
+                  </a:txBody>
+                  <a:tcPr marL="9525" marR="9525" marT="9525" marB="0" anchor="ctr"/>
+                </a:tc>
+              </a:tr>
+              <a:tr h="353137">
+                <a:tc>
+                  <a:txBody>
+                    <a:bodyPr/>
+                    <a:lstStyle/>
+                    <a:p>
+                      <a:pPr algn="l" rtl="0" fontAlgn="b"/>
+                      <a:r>
+                        <a:rPr lang="en-US" sz="1600" b="1" i="0" u="none" strike="noStrike" dirty="0">
+                          <a:solidFill>
+                            <a:schemeClr val="bg2">
+                              <a:lumMod val="10000"/>
+                            </a:schemeClr>
+                          </a:solidFill>
+                          <a:effectLst/>
+                          <a:latin typeface="Calibri" panose="020F0502020204030204" pitchFamily="34" charset="0"/>
+                        </a:rPr>
+                        <a:t>$skip</a:t>
+                      </a:r>
+                    </a:p>
+                  </a:txBody>
+                  <a:tcPr marL="9525" marR="9525" marT="9525" marB="0" anchor="ctr"/>
+                </a:tc>
+                <a:tc>
+                  <a:txBody>
+                    <a:bodyPr/>
+                    <a:lstStyle/>
+                    <a:p>
+                      <a:pPr algn="l" rtl="0" fontAlgn="b"/>
+                      <a:r>
+                        <a:rPr lang="en-US" sz="1600" b="1" i="0" u="none" strike="noStrike" dirty="0">
+                          <a:solidFill>
+                            <a:schemeClr val="bg2">
+                              <a:lumMod val="10000"/>
+                            </a:schemeClr>
+                          </a:solidFill>
+                          <a:effectLst/>
+                          <a:latin typeface="Calibri" panose="020F0502020204030204" pitchFamily="34" charset="0"/>
+                        </a:rPr>
+                        <a:t>Skip first n results</a:t>
+                      </a:r>
+                    </a:p>
+                  </a:txBody>
+                  <a:tcPr marL="9525" marR="9525" marT="9525" marB="0" anchor="ctr"/>
+                </a:tc>
+                <a:tc>
+                  <a:txBody>
+                    <a:bodyPr/>
+                    <a:lstStyle/>
+                    <a:p>
+                      <a:pPr algn="l" rtl="0" fontAlgn="b"/>
+                      <a:r>
+                        <a:rPr lang="en-US" sz="1600" b="1" i="0" u="none" strike="noStrike">
+                          <a:solidFill>
+                            <a:schemeClr val="bg2">
+                              <a:lumMod val="10000"/>
+                            </a:schemeClr>
+                          </a:solidFill>
+                          <a:effectLst/>
+                          <a:latin typeface="Calibri" panose="020F0502020204030204" pitchFamily="34" charset="0"/>
+                        </a:rPr>
+                        <a:t>/Products?$skip=2</a:t>
+                      </a:r>
+                    </a:p>
+                  </a:txBody>
+                  <a:tcPr marL="9525" marR="9525" marT="9525" marB="0" anchor="ctr"/>
+                </a:tc>
+              </a:tr>
+              <a:tr h="473469">
+                <a:tc>
+                  <a:txBody>
+                    <a:bodyPr/>
+                    <a:lstStyle/>
+                    <a:p>
+                      <a:pPr algn="l" rtl="0" fontAlgn="b"/>
+                      <a:r>
+                        <a:rPr lang="en-US" sz="1600" b="1" i="0" u="none" strike="noStrike">
+                          <a:solidFill>
+                            <a:schemeClr val="bg2">
+                              <a:lumMod val="10000"/>
+                            </a:schemeClr>
+                          </a:solidFill>
+                          <a:effectLst/>
+                          <a:latin typeface="Calibri" panose="020F0502020204030204" pitchFamily="34" charset="0"/>
+                        </a:rPr>
+                        <a:t>$select</a:t>
+                      </a:r>
+                    </a:p>
+                  </a:txBody>
+                  <a:tcPr marL="9525" marR="9525" marT="9525" marB="0" anchor="ctr"/>
+                </a:tc>
+                <a:tc>
+                  <a:txBody>
+                    <a:bodyPr/>
+                    <a:lstStyle/>
+                    <a:p>
+                      <a:pPr algn="l" rtl="0" fontAlgn="b"/>
+                      <a:r>
+                        <a:rPr lang="en-US" sz="1600" b="1" i="0" u="none" strike="noStrike" dirty="0">
+                          <a:solidFill>
+                            <a:schemeClr val="bg2">
+                              <a:lumMod val="10000"/>
+                            </a:schemeClr>
+                          </a:solidFill>
+                          <a:effectLst/>
+                          <a:latin typeface="Calibri" panose="020F0502020204030204" pitchFamily="34" charset="0"/>
+                        </a:rPr>
+                        <a:t>Selects the specified Columns</a:t>
+                      </a:r>
+                    </a:p>
+                  </a:txBody>
+                  <a:tcPr marL="9525" marR="9525" marT="9525" marB="0" anchor="ctr"/>
+                </a:tc>
+                <a:tc>
+                  <a:txBody>
+                    <a:bodyPr/>
+                    <a:lstStyle/>
+                    <a:p>
+                      <a:pPr algn="l" rtl="0" fontAlgn="b"/>
+                      <a:r>
+                        <a:rPr lang="en-US" sz="1600" b="1" i="0" u="none" strike="noStrike">
+                          <a:solidFill>
+                            <a:schemeClr val="bg2">
+                              <a:lumMod val="10000"/>
+                            </a:schemeClr>
+                          </a:solidFill>
+                          <a:effectLst/>
+                          <a:latin typeface="Calibri" panose="020F0502020204030204" pitchFamily="34" charset="0"/>
+                        </a:rPr>
+                        <a:t>/Products?$orderby=Price desc</a:t>
+                      </a:r>
+                    </a:p>
+                  </a:txBody>
+                  <a:tcPr marL="9525" marR="9525" marT="9525" marB="0" anchor="ctr"/>
+                </a:tc>
+              </a:tr>
+              <a:tr h="335158">
+                <a:tc>
+                  <a:txBody>
+                    <a:bodyPr/>
+                    <a:lstStyle/>
+                    <a:p>
+                      <a:pPr algn="l" rtl="0" fontAlgn="b"/>
+                      <a:r>
+                        <a:rPr lang="en-US" sz="1600" b="1" i="0" u="none" strike="noStrike">
+                          <a:solidFill>
+                            <a:schemeClr val="bg2">
+                              <a:lumMod val="10000"/>
+                            </a:schemeClr>
+                          </a:solidFill>
+                          <a:effectLst/>
+                          <a:latin typeface="Calibri" panose="020F0502020204030204" pitchFamily="34" charset="0"/>
+                        </a:rPr>
+                        <a:t>$count</a:t>
+                      </a:r>
+                    </a:p>
+                  </a:txBody>
+                  <a:tcPr marL="9525" marR="9525" marT="9525" marB="0" anchor="ctr"/>
+                </a:tc>
+                <a:tc>
+                  <a:txBody>
+                    <a:bodyPr/>
+                    <a:lstStyle/>
+                    <a:p>
+                      <a:pPr algn="l" rtl="0" fontAlgn="b"/>
+                      <a:r>
+                        <a:rPr lang="en-US" sz="1600" b="1" i="0" u="none" strike="noStrike" dirty="0">
+                          <a:solidFill>
+                            <a:schemeClr val="bg2">
+                              <a:lumMod val="10000"/>
+                            </a:schemeClr>
+                          </a:solidFill>
+                          <a:effectLst/>
+                          <a:latin typeface="Calibri" panose="020F0502020204030204" pitchFamily="34" charset="0"/>
+                        </a:rPr>
+                        <a:t>Returns total Count of result</a:t>
+                      </a:r>
+                    </a:p>
+                  </a:txBody>
+                  <a:tcPr marL="9525" marR="9525" marT="9525" marB="0" anchor="ctr"/>
+                </a:tc>
+                <a:tc>
+                  <a:txBody>
+                    <a:bodyPr/>
+                    <a:lstStyle/>
+                    <a:p>
+                      <a:pPr algn="l" rtl="0" fontAlgn="b"/>
+                      <a:r>
+                        <a:rPr lang="en-US" sz="1600" b="1" i="0" u="none" strike="noStrike">
+                          <a:solidFill>
+                            <a:schemeClr val="bg2">
+                              <a:lumMod val="10000"/>
+                            </a:schemeClr>
+                          </a:solidFill>
+                          <a:effectLst/>
+                          <a:latin typeface="Calibri" panose="020F0502020204030204" pitchFamily="34" charset="0"/>
+                        </a:rPr>
+                        <a:t>/Products?$count=true</a:t>
+                      </a:r>
+                    </a:p>
+                  </a:txBody>
+                  <a:tcPr marL="9525" marR="9525" marT="9525" marB="0" anchor="ctr"/>
+                </a:tc>
+              </a:tr>
+              <a:tr h="368490">
+                <a:tc>
+                  <a:txBody>
+                    <a:bodyPr/>
+                    <a:lstStyle/>
+                    <a:p>
+                      <a:pPr algn="l" rtl="0" fontAlgn="b"/>
+                      <a:r>
+                        <a:rPr lang="en-US" sz="1600" b="1" i="0" u="none" strike="noStrike">
+                          <a:solidFill>
+                            <a:schemeClr val="bg2">
+                              <a:lumMod val="10000"/>
+                            </a:schemeClr>
+                          </a:solidFill>
+                          <a:effectLst/>
+                          <a:latin typeface="Calibri" panose="020F0502020204030204" pitchFamily="34" charset="0"/>
+                        </a:rPr>
+                        <a:t>$expand</a:t>
+                      </a:r>
+                    </a:p>
+                  </a:txBody>
+                  <a:tcPr marL="9525" marR="9525" marT="9525" marB="0" anchor="ctr"/>
+                </a:tc>
+                <a:tc>
+                  <a:txBody>
+                    <a:bodyPr/>
+                    <a:lstStyle/>
+                    <a:p>
+                      <a:pPr algn="l" rtl="0" fontAlgn="b"/>
+                      <a:r>
+                        <a:rPr lang="en-US" sz="1600" b="1" i="0" u="none" strike="noStrike" dirty="0">
+                          <a:solidFill>
+                            <a:schemeClr val="bg2">
+                              <a:lumMod val="10000"/>
+                            </a:schemeClr>
+                          </a:solidFill>
+                          <a:effectLst/>
+                          <a:latin typeface="Calibri" panose="020F0502020204030204" pitchFamily="34" charset="0"/>
+                        </a:rPr>
+                        <a:t>Loads that entity</a:t>
+                      </a:r>
+                    </a:p>
+                  </a:txBody>
+                  <a:tcPr marL="9525" marR="9525" marT="9525" marB="0" anchor="ctr"/>
+                </a:tc>
+                <a:tc>
+                  <a:txBody>
+                    <a:bodyPr/>
+                    <a:lstStyle/>
+                    <a:p>
+                      <a:pPr algn="l" rtl="0" fontAlgn="b"/>
+                      <a:r>
+                        <a:rPr lang="en-US" sz="1600" b="1" i="0" u="none" strike="noStrike" dirty="0">
+                          <a:solidFill>
+                            <a:schemeClr val="bg2">
+                              <a:lumMod val="10000"/>
+                            </a:schemeClr>
+                          </a:solidFill>
+                          <a:effectLst/>
+                          <a:latin typeface="Calibri" panose="020F0502020204030204" pitchFamily="34" charset="0"/>
+                        </a:rPr>
+                        <a:t>/Products?$expand=Supplier</a:t>
+                      </a:r>
+                    </a:p>
+                  </a:txBody>
+                  <a:tcPr marL="9525" marR="9525" marT="9525" marB="0" anchor="ctr"/>
+                </a:tc>
+              </a:tr>
+            </a:tbl>
+          </a:graphicData>
+        </a:graphic>
+      </p:graphicFrame>
     </p:spTree>
     <p:extLst>
       <p:ext uri="{BB962C8B-B14F-4D97-AF65-F5344CB8AC3E}">
@@ -3423,13 +3997,13 @@
         </p:nvSpPr>
         <p:spPr>
           <a:xfrm>
-            <a:off x="838200" y="1501254"/>
-            <a:ext cx="10515600" cy="4995080"/>
+            <a:off x="838200" y="1774208"/>
+            <a:ext cx="10175543" cy="4722125"/>
           </a:xfrm>
         </p:spPr>
         <p:txBody>
           <a:bodyPr>
-            <a:normAutofit fontScale="77500" lnSpcReduction="20000"/>
+            <a:normAutofit fontScale="85000" lnSpcReduction="20000"/>
           </a:bodyPr>
           <a:lstStyle/>
           <a:p>
@@ -4144,10 +4718,10 @@
                 <a:ea typeface="Times New Roman" pitchFamily="18"/>
                 <a:cs typeface="Times New Roman" pitchFamily="18"/>
               </a:rPr>
-              <a:t>/Products?$</a:t>
-            </a:r>
-            <a:r>
-              <a:rPr lang="en-US" b="0" i="0" u="none" strike="noStrike" baseline="0" dirty="0" err="1" smtClean="0">
+              <a:t>/Products</a:t>
+            </a:r>
+            <a:r>
+              <a:rPr lang="en-US" b="0" i="0" u="none" strike="noStrike" baseline="0" dirty="0" smtClean="0">
                 <a:ln>
                   <a:noFill/>
                 </a:ln>
@@ -4158,106 +4732,19 @@
                 <a:ea typeface="Times New Roman" pitchFamily="18"/>
                 <a:cs typeface="Times New Roman" pitchFamily="18"/>
               </a:rPr>
-              <a:t>inlinecount</a:t>
-            </a:r>
-            <a:r>
-              <a:rPr lang="en-US" b="0" i="0" u="none" strike="noStrike" baseline="0" dirty="0" smtClean="0">
-                <a:ln>
-                  <a:noFill/>
-                </a:ln>
-                <a:solidFill>
-                  <a:srgbClr val="000000"/>
-                </a:solidFill>
-                <a:latin typeface="Georgia" pitchFamily="18"/>
-                <a:ea typeface="Times New Roman" pitchFamily="18"/>
-                <a:cs typeface="Times New Roman" pitchFamily="18"/>
-              </a:rPr>
-              <a:t>=</a:t>
-            </a:r>
-            <a:r>
-              <a:rPr lang="en-US" b="0" i="0" u="none" strike="noStrike" baseline="0" dirty="0" err="1" smtClean="0">
-                <a:ln>
-                  <a:noFill/>
-                </a:ln>
-                <a:solidFill>
-                  <a:srgbClr val="000000"/>
-                </a:solidFill>
-                <a:latin typeface="Georgia" pitchFamily="18"/>
-                <a:ea typeface="Times New Roman" pitchFamily="18"/>
-                <a:cs typeface="Times New Roman" pitchFamily="18"/>
-              </a:rPr>
-              <a:t>allpages</a:t>
-            </a:r>
-            <a:r>
-              <a:rPr lang="en-US" b="0" i="0" u="none" strike="noStrike" baseline="0" dirty="0" smtClean="0">
-                <a:ln>
-                  <a:noFill/>
-                </a:ln>
-                <a:solidFill>
-                  <a:srgbClr val="000000"/>
-                </a:solidFill>
-                <a:latin typeface="Georgia" pitchFamily="18"/>
-                <a:ea typeface="Times New Roman" pitchFamily="18"/>
-                <a:cs typeface="Times New Roman" pitchFamily="18"/>
-              </a:rPr>
-              <a:t> (&lt;</a:t>
-            </a:r>
-            <a:r>
-              <a:rPr lang="en-US" b="0" i="0" u="none" strike="noStrike" baseline="0" dirty="0" err="1" smtClean="0">
-                <a:ln>
-                  <a:noFill/>
-                </a:ln>
-                <a:solidFill>
-                  <a:srgbClr val="000000"/>
-                </a:solidFill>
-                <a:latin typeface="Georgia" pitchFamily="18"/>
-                <a:ea typeface="Times New Roman" pitchFamily="18"/>
-                <a:cs typeface="Times New Roman" pitchFamily="18"/>
-              </a:rPr>
-              <a:t>m:count</a:t>
-            </a:r>
-            <a:r>
-              <a:rPr lang="en-US" b="0" i="0" u="none" strike="noStrike" baseline="0" dirty="0" smtClean="0">
-                <a:ln>
-                  <a:noFill/>
-                </a:ln>
-                <a:solidFill>
-                  <a:srgbClr val="000000"/>
-                </a:solidFill>
-                <a:latin typeface="Georgia" pitchFamily="18"/>
-                <a:ea typeface="Times New Roman" pitchFamily="18"/>
-                <a:cs typeface="Times New Roman" pitchFamily="18"/>
-              </a:rPr>
-              <a:t>&gt;11&lt;/</a:t>
-            </a:r>
-            <a:r>
-              <a:rPr lang="en-US" b="0" i="0" u="none" strike="noStrike" baseline="0" dirty="0" err="1" smtClean="0">
-                <a:ln>
-                  <a:noFill/>
-                </a:ln>
-                <a:solidFill>
-                  <a:srgbClr val="000000"/>
-                </a:solidFill>
-                <a:latin typeface="Georgia" pitchFamily="18"/>
-                <a:ea typeface="Times New Roman" pitchFamily="18"/>
-                <a:cs typeface="Times New Roman" pitchFamily="18"/>
-              </a:rPr>
-              <a:t>m:count</a:t>
-            </a:r>
-            <a:r>
-              <a:rPr lang="en-US" b="0" i="0" u="none" strike="noStrike" baseline="0" dirty="0" smtClean="0">
-                <a:ln>
-                  <a:noFill/>
-                </a:ln>
-                <a:solidFill>
-                  <a:srgbClr val="000000"/>
-                </a:solidFill>
-                <a:latin typeface="Georgia" pitchFamily="18"/>
-                <a:ea typeface="Times New Roman" pitchFamily="18"/>
-                <a:cs typeface="Times New Roman" pitchFamily="18"/>
-              </a:rPr>
-              <a:t>&gt;)</a:t>
-            </a:r>
+              <a:t>?$count=true&amp;$top=5</a:t>
+            </a:r>
+            <a:endParaRPr lang="en-US" b="0" i="0" u="none" strike="noStrike" baseline="0" dirty="0" smtClean="0">
+              <a:ln>
+                <a:noFill/>
+              </a:ln>
+              <a:solidFill>
+                <a:srgbClr val="000000"/>
+              </a:solidFill>
+              <a:latin typeface="Georgia" pitchFamily="18"/>
+              <a:ea typeface="Times New Roman" pitchFamily="18"/>
+              <a:cs typeface="Times New Roman" pitchFamily="18"/>
+            </a:endParaRPr>
           </a:p>
           <a:p>
             <a:pPr marL="0" lvl="0" indent="0" hangingPunct="0">
@@ -4349,10 +4836,10 @@
                 <a:ea typeface="Times New Roman" pitchFamily="18"/>
                 <a:cs typeface="Times New Roman" pitchFamily="18"/>
               </a:rPr>
-              <a:t>/Categories?$expand=Products&amp;$select=</a:t>
-            </a:r>
-            <a:r>
-              <a:rPr lang="en-US" b="0" i="0" u="none" strike="noStrike" baseline="0" dirty="0" err="1" smtClean="0">
+              <a:t>/Categories?$</a:t>
+            </a:r>
+            <a:r>
+              <a:rPr lang="en-US" b="0" i="0" u="none" strike="noStrike" baseline="0" dirty="0" smtClean="0">
                 <a:ln>
                   <a:noFill/>
                 </a:ln>
@@ -4363,7 +4850,7 @@
                 <a:ea typeface="Times New Roman" pitchFamily="18"/>
                 <a:cs typeface="Times New Roman" pitchFamily="18"/>
               </a:rPr>
-              <a:t>Name,Products</a:t>
+              <a:t>expand=Products($select=Name)&amp;$select=Name</a:t>
             </a:r>
             <a:r>
               <a:rPr lang="en-US" b="0" i="0" u="none" strike="noStrike" baseline="0" dirty="0" smtClean="0">
@@ -4377,7 +4864,7 @@
                 <a:ea typeface="Times New Roman" pitchFamily="18"/>
                 <a:cs typeface="Times New Roman" pitchFamily="18"/>
               </a:rPr>
-              <a:t>/Name&amp;$top=1</a:t>
+              <a:t>&amp;$top=1</a:t>
             </a:r>
           </a:p>
           <a:p>
@@ -4470,8 +4957,33 @@
                 <a:ea typeface="Times New Roman" pitchFamily="18"/>
                 <a:cs typeface="Times New Roman" pitchFamily="18"/>
               </a:rPr>
-              <a:t>/Products(1)/Name</a:t>
-            </a:r>
+              <a:t>/Products(1</a:t>
+            </a:r>
+            <a:r>
+              <a:rPr lang="en-US" b="0" i="0" u="none" strike="noStrike" baseline="0" dirty="0" smtClean="0">
+                <a:ln>
+                  <a:noFill/>
+                </a:ln>
+                <a:solidFill>
+                  <a:srgbClr val="000000"/>
+                </a:solidFill>
+                <a:latin typeface="Georgia" pitchFamily="18"/>
+                <a:ea typeface="Times New Roman" pitchFamily="18"/>
+                <a:cs typeface="Times New Roman" pitchFamily="18"/>
+              </a:rPr>
+              <a:t>)/Supplier</a:t>
+            </a:r>
+            <a:endParaRPr lang="en-US" b="0" i="0" u="none" strike="noStrike" baseline="0" dirty="0" smtClean="0">
+              <a:ln>
+                <a:noFill/>
+              </a:ln>
+              <a:solidFill>
+                <a:srgbClr val="000000"/>
+              </a:solidFill>
+              <a:latin typeface="Georgia" pitchFamily="18"/>
+              <a:ea typeface="Times New Roman" pitchFamily="18"/>
+              <a:cs typeface="Times New Roman" pitchFamily="18"/>
+            </a:endParaRPr>
           </a:p>
           <a:p>
             <a:pPr marL="0" lvl="0" indent="0" hangingPunct="0">
@@ -4506,79 +5018,6 @@
                 <a:tab pos="9144000" algn="l"/>
               </a:tabLst>
             </a:pPr>
-            <a:endParaRPr lang="en-US" b="0" i="0" u="none" strike="noStrike" baseline="0" dirty="0" smtClean="0">
-              <a:ln>
-                <a:noFill/>
-              </a:ln>
-              <a:solidFill>
-                <a:srgbClr val="000000"/>
-              </a:solidFill>
-              <a:latin typeface="Georgia" pitchFamily="18"/>
-              <a:ea typeface="Times New Roman" pitchFamily="18"/>
-              <a:cs typeface="Times New Roman" pitchFamily="18"/>
-            </a:endParaRPr>
-          </a:p>
-          <a:p>
-            <a:pPr marL="0" lvl="0" indent="0" hangingPunct="0">
-              <a:lnSpc>
-                <a:spcPct val="93000"/>
-              </a:lnSpc>
-              <a:spcBef>
-                <a:spcPts val="0"/>
-              </a:spcBef>
-              <a:buNone/>
-              <a:tabLst>
-                <a:tab pos="0" algn="l"/>
-                <a:tab pos="457200" algn="l"/>
-                <a:tab pos="914400" algn="l"/>
-                <a:tab pos="1371599" algn="l"/>
-                <a:tab pos="1828800" algn="l"/>
-                <a:tab pos="2286000" algn="l"/>
-                <a:tab pos="2743199" algn="l"/>
-                <a:tab pos="3200400" algn="l"/>
-                <a:tab pos="3657600" algn="l"/>
-                <a:tab pos="4114800" algn="l"/>
-                <a:tab pos="4572000" algn="l"/>
-                <a:tab pos="5029200" algn="l"/>
-                <a:tab pos="5486399" algn="l"/>
-                <a:tab pos="5943600" algn="l"/>
-                <a:tab pos="6400799" algn="l"/>
-                <a:tab pos="6858000" algn="l"/>
-                <a:tab pos="7315200" algn="l"/>
-                <a:tab pos="7772400" algn="l"/>
-                <a:tab pos="8229600" algn="l"/>
-                <a:tab pos="8686800" algn="l"/>
-                <a:tab pos="9144000" algn="l"/>
-              </a:tabLst>
-            </a:pPr>
-            <a:r>
-              <a:rPr lang="en-US" b="0" i="0" u="none" strike="noStrike" baseline="0" dirty="0" smtClean="0">
-                <a:ln>
-                  <a:noFill/>
-                </a:ln>
-                <a:solidFill>
-                  <a:srgbClr val="000000"/>
-                </a:solidFill>
-                <a:latin typeface="Georgia" pitchFamily="18"/>
-                <a:ea typeface="Times New Roman" pitchFamily="18"/>
-                <a:cs typeface="Times New Roman" pitchFamily="18"/>
-              </a:rPr>
-              <a:t>/Products(1)/Name/$value</a:t>
-            </a:r>
-            <a:r>
-              <a:rPr lang="en-US" sz="3200" b="0" i="0" u="none" strike="noStrike" baseline="0" dirty="0" smtClean="0">
-                <a:ln>
-                  <a:noFill/>
-                </a:ln>
-                <a:solidFill>
-                  <a:srgbClr val="000000"/>
-                </a:solidFill>
-                <a:latin typeface="Georgia" pitchFamily="18"/>
-                <a:ea typeface="Times New Roman" pitchFamily="18"/>
-                <a:cs typeface="Times New Roman" pitchFamily="18"/>
-              </a:rPr>
-              <a:t>  </a:t>
-            </a:r>
             <a:endParaRPr lang="en-US" sz="3200" b="0" i="0" u="none" strike="noStrike" baseline="0" dirty="0">
               <a:ln>
                 <a:noFill/>
@@ -4593,6 +5032,47 @@
           </a:p>
         </p:txBody>
       </p:sp>
+      <p:pic>
+        <p:nvPicPr>
+          <p:cNvPr id="4" name="Picture 2" descr="https://s-media-cache-ak0.pinimg.com/736x/58/df/35/58df3549ac4993bc85b985d37e5b3e24.jpg"/>
+          <p:cNvPicPr>
+            <a:picLocks noChangeAspect="1" noChangeArrowheads="1"/>
+          </p:cNvPicPr>
+          <p:nvPr/>
+        </p:nvPicPr>
+        <p:blipFill>
+          <a:blip r:embed="rId3" cstate="print">
+            <a:extLst>
+              <a:ext uri="{28A0092B-C50C-407E-A947-70E740481C1C}">
+                <a14:useLocalDpi xmlns:a14="http://schemas.microsoft.com/office/drawing/2010/main" val="0"/>
+              </a:ext>
+            </a:extLst>
+          </a:blip>
+          <a:srcRect/>
+          <a:stretch>
+            <a:fillRect/>
+          </a:stretch>
+        </p:blipFill>
+        <p:spPr bwMode="auto">
+          <a:xfrm>
+            <a:off x="9579590" y="542739"/>
+            <a:ext cx="1774210" cy="1685018"/>
+          </a:xfrm>
+          <a:prstGeom prst="rect">
+            <a:avLst/>
+          </a:prstGeom>
+          <a:noFill/>
+          <a:extLst>
+            <a:ext uri="{909E8E84-426E-40DD-AFC4-6F175D3DCCD1}">
+              <a14:hiddenFill xmlns:a14="http://schemas.microsoft.com/office/drawing/2010/main">
+                <a:solidFill>
+                  <a:srgbClr val="FFFFFF"/>
+                </a:solidFill>
+              </a14:hiddenFill>
+            </a:ext>
+          </a:extLst>
+        </p:spPr>
+      </p:pic>
     </p:spTree>
     <p:extLst>
       <p:ext uri="{BB962C8B-B14F-4D97-AF65-F5344CB8AC3E}">
@@ -5162,38 +5642,6 @@
           </a:p>
         </p:txBody>
       </p:sp>
-      <p:pic>
-        <p:nvPicPr>
-          <p:cNvPr id="6" name="Picture 5"/>
-          <p:cNvPicPr>
-            <a:picLocks noChangeAspect="1"/>
-          </p:cNvPicPr>
-          <p:nvPr/>
-        </p:nvPicPr>
-        <p:blipFill>
-          <a:blip r:embed="rId2">
-            <a:lum bright="-50000"/>
-            <a:alphaModFix/>
-          </a:blip>
-          <a:srcRect/>
-          <a:stretch>
-            <a:fillRect/>
-          </a:stretch>
-        </p:blipFill>
-        <p:spPr>
-          <a:xfrm>
-            <a:off x="533198" y="1845014"/>
-            <a:ext cx="4298110" cy="3728880"/>
-          </a:xfrm>
-          <a:prstGeom prst="rect">
-            <a:avLst/>
-          </a:prstGeom>
-          <a:noFill/>
-          <a:ln>
-            <a:noFill/>
-          </a:ln>
-        </p:spPr>
-      </p:pic>
       <p:sp>
         <p:nvSpPr>
           <p:cNvPr id="7" name="Freeform 6"/>
@@ -5202,8 +5650,8 @@
         </p:nvSpPr>
         <p:spPr>
           <a:xfrm>
-            <a:off x="5235088" y="2927534"/>
-            <a:ext cx="6542930" cy="1563839"/>
+            <a:off x="5811983" y="3186841"/>
+            <a:ext cx="6211695" cy="1563839"/>
           </a:xfrm>
           <a:custGeom>
             <a:avLst/>
@@ -5578,6 +6026,423 @@
           </a:p>
         </p:txBody>
       </p:sp>
+      <p:pic>
+        <p:nvPicPr>
+          <p:cNvPr id="8" name="Picture 2" descr="https://s-media-cache-ak0.pinimg.com/736x/58/df/35/58df3549ac4993bc85b985d37e5b3e24.jpg"/>
+          <p:cNvPicPr>
+            <a:picLocks noChangeAspect="1" noChangeArrowheads="1"/>
+          </p:cNvPicPr>
+          <p:nvPr/>
+        </p:nvPicPr>
+        <p:blipFill>
+          <a:blip r:embed="rId2" cstate="print">
+            <a:extLst>
+              <a:ext uri="{28A0092B-C50C-407E-A947-70E740481C1C}">
+                <a14:useLocalDpi xmlns:a14="http://schemas.microsoft.com/office/drawing/2010/main" val="0"/>
+              </a:ext>
+            </a:extLst>
+          </a:blip>
+          <a:srcRect/>
+          <a:stretch>
+            <a:fillRect/>
+          </a:stretch>
+        </p:blipFill>
+        <p:spPr bwMode="auto">
+          <a:xfrm>
+            <a:off x="9826388" y="608968"/>
+            <a:ext cx="1774210" cy="1685018"/>
+          </a:xfrm>
+          <a:prstGeom prst="rect">
+            <a:avLst/>
+          </a:prstGeom>
+          <a:noFill/>
+          <a:extLst>
+            <a:ext uri="{909E8E84-426E-40DD-AFC4-6F175D3DCCD1}">
+              <a14:hiddenFill xmlns:a14="http://schemas.microsoft.com/office/drawing/2010/main">
+                <a:solidFill>
+                  <a:srgbClr val="FFFFFF"/>
+                </a:solidFill>
+              </a14:hiddenFill>
+            </a:ext>
+          </a:extLst>
+        </p:spPr>
+      </p:pic>
+      <p:graphicFrame>
+        <p:nvGraphicFramePr>
+          <p:cNvPr id="3" name="Table 2"/>
+          <p:cNvGraphicFramePr>
+            <a:graphicFrameLocks noGrp="1"/>
+          </p:cNvGraphicFramePr>
+          <p:nvPr>
+            <p:extLst>
+              <p:ext uri="{D42A27DB-BD31-4B8C-83A1-F6EECF244321}">
+                <p14:modId xmlns:p14="http://schemas.microsoft.com/office/powerpoint/2010/main" val="1795901187"/>
+              </p:ext>
+            </p:extLst>
+          </p:nvPr>
+        </p:nvGraphicFramePr>
+        <p:xfrm>
+          <a:off x="579168" y="1828804"/>
+          <a:ext cx="4803544" cy="3807721"/>
+        </p:xfrm>
+        <a:graphic>
+          <a:graphicData uri="http://schemas.openxmlformats.org/drawingml/2006/table">
+            <a:tbl>
+              <a:tblPr firstRow="1" bandRow="1">
+                <a:tableStyleId>{5C22544A-7EE6-4342-B048-85BDC9FD1C3A}</a:tableStyleId>
+              </a:tblPr>
+              <a:tblGrid>
+                <a:gridCol w="1990295"/>
+                <a:gridCol w="2813249"/>
+              </a:tblGrid>
+              <a:tr h="430390">
+                <a:tc>
+                  <a:txBody>
+                    <a:bodyPr/>
+                    <a:lstStyle/>
+                    <a:p>
+                      <a:pPr algn="l"/>
+                      <a:r>
+                        <a:rPr lang="en-US" dirty="0" smtClean="0"/>
+                        <a:t>Logical Operators</a:t>
+                      </a:r>
+                      <a:endParaRPr lang="en-US" dirty="0"/>
+                    </a:p>
+                  </a:txBody>
+                  <a:tcPr/>
+                </a:tc>
+                <a:tc>
+                  <a:txBody>
+                    <a:bodyPr/>
+                    <a:lstStyle/>
+                    <a:p>
+                      <a:pPr algn="l"/>
+                      <a:r>
+                        <a:rPr lang="en-US" dirty="0" smtClean="0"/>
+                        <a:t>Explanation</a:t>
+                      </a:r>
+                      <a:endParaRPr lang="en-US" dirty="0"/>
+                    </a:p>
+                  </a:txBody>
+                  <a:tcPr/>
+                </a:tc>
+              </a:tr>
+              <a:tr h="371187">
+                <a:tc>
+                  <a:txBody>
+                    <a:bodyPr/>
+                    <a:lstStyle/>
+                    <a:p>
+                      <a:pPr algn="ctr"/>
+                      <a:r>
+                        <a:rPr lang="en-US" b="1" dirty="0" smtClean="0"/>
+                        <a:t>and</a:t>
+                      </a:r>
+                      <a:endParaRPr lang="en-US" b="1" dirty="0"/>
+                    </a:p>
+                  </a:txBody>
+                  <a:tcPr/>
+                </a:tc>
+                <a:tc>
+                  <a:txBody>
+                    <a:bodyPr/>
+                    <a:lstStyle/>
+                    <a:p>
+                      <a:pPr algn="l"/>
+                      <a:r>
+                        <a:rPr lang="en-US" dirty="0" smtClean="0"/>
+                        <a:t>AND operation</a:t>
+                      </a:r>
+                      <a:endParaRPr lang="en-US" dirty="0"/>
+                    </a:p>
+                  </a:txBody>
+                  <a:tcPr/>
+                </a:tc>
+              </a:tr>
+              <a:tr h="371187">
+                <a:tc>
+                  <a:txBody>
+                    <a:bodyPr/>
+                    <a:lstStyle/>
+                    <a:p>
+                      <a:pPr algn="ctr"/>
+                      <a:r>
+                        <a:rPr lang="en-US" b="1" dirty="0" smtClean="0"/>
+                        <a:t>or</a:t>
+                      </a:r>
+                      <a:endParaRPr lang="en-US" b="1" dirty="0"/>
+                    </a:p>
+                  </a:txBody>
+                  <a:tcPr/>
+                </a:tc>
+                <a:tc>
+                  <a:txBody>
+                    <a:bodyPr/>
+                    <a:lstStyle/>
+                    <a:p>
+                      <a:pPr algn="l"/>
+                      <a:r>
+                        <a:rPr lang="en-US" dirty="0" smtClean="0"/>
+                        <a:t>OR </a:t>
+                      </a:r>
+                      <a:r>
+                        <a:rPr lang="en-US" dirty="0" smtClean="0"/>
+                        <a:t>operation</a:t>
+                      </a:r>
+                      <a:endParaRPr lang="en-US" dirty="0"/>
+                    </a:p>
+                  </a:txBody>
+                  <a:tcPr/>
+                </a:tc>
+              </a:tr>
+              <a:tr h="371187">
+                <a:tc>
+                  <a:txBody>
+                    <a:bodyPr/>
+                    <a:lstStyle/>
+                    <a:p>
+                      <a:pPr algn="ctr"/>
+                      <a:r>
+                        <a:rPr lang="en-US" b="1" dirty="0" smtClean="0"/>
+                        <a:t>not</a:t>
+                      </a:r>
+                      <a:endParaRPr lang="en-US" b="1" dirty="0"/>
+                    </a:p>
+                  </a:txBody>
+                  <a:tcPr/>
+                </a:tc>
+                <a:tc>
+                  <a:txBody>
+                    <a:bodyPr/>
+                    <a:lstStyle/>
+                    <a:p>
+                      <a:pPr algn="l"/>
+                      <a:r>
+                        <a:rPr lang="en-US" dirty="0" smtClean="0"/>
+                        <a:t>NOT </a:t>
+                      </a:r>
+                      <a:r>
+                        <a:rPr lang="en-US" dirty="0" smtClean="0"/>
+                        <a:t>operation</a:t>
+                      </a:r>
+                      <a:endParaRPr lang="en-US" dirty="0"/>
+                    </a:p>
+                  </a:txBody>
+                  <a:tcPr/>
+                </a:tc>
+              </a:tr>
+              <a:tr h="371187">
+                <a:tc>
+                  <a:txBody>
+                    <a:bodyPr/>
+                    <a:lstStyle/>
+                    <a:p>
+                      <a:pPr algn="ctr"/>
+                      <a:r>
+                        <a:rPr lang="en-US" b="1" dirty="0" err="1" smtClean="0"/>
+                        <a:t>eq</a:t>
+                      </a:r>
+                      <a:endParaRPr lang="en-US" b="1" dirty="0"/>
+                    </a:p>
+                  </a:txBody>
+                  <a:tcPr/>
+                </a:tc>
+                <a:tc>
+                  <a:txBody>
+                    <a:bodyPr/>
+                    <a:lstStyle/>
+                    <a:p>
+                      <a:pPr algn="l"/>
+                      <a:r>
+                        <a:rPr lang="en-US" dirty="0" smtClean="0"/>
+                        <a:t>Equal </a:t>
+                      </a:r>
+                      <a:r>
+                        <a:rPr lang="en-US" dirty="0" smtClean="0"/>
+                        <a:t>operation</a:t>
+                      </a:r>
+                      <a:endParaRPr lang="en-US" dirty="0"/>
+                    </a:p>
+                  </a:txBody>
+                  <a:tcPr/>
+                </a:tc>
+              </a:tr>
+              <a:tr h="371187">
+                <a:tc>
+                  <a:txBody>
+                    <a:bodyPr/>
+                    <a:lstStyle/>
+                    <a:p>
+                      <a:pPr algn="ctr"/>
+                      <a:r>
+                        <a:rPr lang="en-US" b="1" dirty="0" smtClean="0"/>
+                        <a:t>ne</a:t>
+                      </a:r>
+                      <a:endParaRPr lang="en-US" b="1" dirty="0"/>
+                    </a:p>
+                  </a:txBody>
+                  <a:tcPr/>
+                </a:tc>
+                <a:tc>
+                  <a:txBody>
+                    <a:bodyPr/>
+                    <a:lstStyle/>
+                    <a:p>
+                      <a:pPr algn="l"/>
+                      <a:r>
+                        <a:rPr lang="en-US" dirty="0" smtClean="0"/>
+                        <a:t>Not</a:t>
+                      </a:r>
+                      <a:r>
+                        <a:rPr lang="en-US" baseline="0" dirty="0" smtClean="0"/>
+                        <a:t> Equal Check</a:t>
+                      </a:r>
+                      <a:endParaRPr lang="en-US" dirty="0"/>
+                    </a:p>
+                  </a:txBody>
+                  <a:tcPr/>
+                </a:tc>
+              </a:tr>
+              <a:tr h="371187">
+                <a:tc>
+                  <a:txBody>
+                    <a:bodyPr/>
+                    <a:lstStyle/>
+                    <a:p>
+                      <a:pPr algn="ctr"/>
+                      <a:r>
+                        <a:rPr lang="en-US" b="1" dirty="0" err="1" smtClean="0"/>
+                        <a:t>lt</a:t>
+                      </a:r>
+                      <a:endParaRPr lang="en-US" b="1" dirty="0"/>
+                    </a:p>
+                  </a:txBody>
+                  <a:tcPr/>
+                </a:tc>
+                <a:tc>
+                  <a:txBody>
+                    <a:bodyPr/>
+                    <a:lstStyle/>
+                    <a:p>
+                      <a:pPr algn="l"/>
+                      <a:r>
+                        <a:rPr lang="en-US" dirty="0" smtClean="0"/>
+                        <a:t>Less than Check</a:t>
+                      </a:r>
+                      <a:endParaRPr lang="en-US" dirty="0"/>
+                    </a:p>
+                  </a:txBody>
+                  <a:tcPr/>
+                </a:tc>
+              </a:tr>
+              <a:tr h="371187">
+                <a:tc>
+                  <a:txBody>
+                    <a:bodyPr/>
+                    <a:lstStyle/>
+                    <a:p>
+                      <a:pPr algn="ctr"/>
+                      <a:r>
+                        <a:rPr lang="en-US" b="1" dirty="0" err="1" smtClean="0"/>
+                        <a:t>gt</a:t>
+                      </a:r>
+                      <a:endParaRPr lang="en-US" b="1" dirty="0"/>
+                    </a:p>
+                  </a:txBody>
+                  <a:tcPr/>
+                </a:tc>
+                <a:tc>
+                  <a:txBody>
+                    <a:bodyPr/>
+                    <a:lstStyle/>
+                    <a:p>
+                      <a:pPr algn="l"/>
+                      <a:r>
+                        <a:rPr lang="en-US" dirty="0" smtClean="0"/>
+                        <a:t>Greater than Check</a:t>
+                      </a:r>
+                      <a:endParaRPr lang="en-US" dirty="0"/>
+                    </a:p>
+                  </a:txBody>
+                  <a:tcPr/>
+                </a:tc>
+              </a:tr>
+              <a:tr h="371187">
+                <a:tc>
+                  <a:txBody>
+                    <a:bodyPr/>
+                    <a:lstStyle/>
+                    <a:p>
+                      <a:pPr algn="ctr"/>
+                      <a:r>
+                        <a:rPr lang="en-US" b="1" dirty="0" smtClean="0"/>
+                        <a:t>le</a:t>
+                      </a:r>
+                      <a:endParaRPr lang="en-US" b="1" dirty="0"/>
+                    </a:p>
+                  </a:txBody>
+                  <a:tcPr/>
+                </a:tc>
+                <a:tc>
+                  <a:txBody>
+                    <a:bodyPr/>
+                    <a:lstStyle/>
+                    <a:p>
+                      <a:pPr algn="l"/>
+                      <a:r>
+                        <a:rPr lang="en-US" dirty="0" smtClean="0"/>
+                        <a:t>Less than equal to</a:t>
+                      </a:r>
+                      <a:r>
+                        <a:rPr lang="en-US" baseline="0" dirty="0" smtClean="0"/>
+                        <a:t> check</a:t>
+                      </a:r>
+                      <a:endParaRPr lang="en-US" dirty="0"/>
+                    </a:p>
+                  </a:txBody>
+                  <a:tcPr/>
+                </a:tc>
+              </a:tr>
+              <a:tr h="407835">
+                <a:tc>
+                  <a:txBody>
+                    <a:bodyPr/>
+                    <a:lstStyle/>
+                    <a:p>
+                      <a:pPr algn="ctr"/>
+                      <a:r>
+                        <a:rPr lang="en-US" b="1" dirty="0" err="1" smtClean="0"/>
+                        <a:t>ge</a:t>
+                      </a:r>
+                      <a:endParaRPr lang="en-US" b="1" dirty="0"/>
+                    </a:p>
+                  </a:txBody>
+                  <a:tcPr/>
+                </a:tc>
+                <a:tc>
+                  <a:txBody>
+                    <a:bodyPr/>
+                    <a:lstStyle/>
+                    <a:p>
+                      <a:pPr algn="l"/>
+                      <a:r>
+                        <a:rPr lang="en-US" dirty="0" smtClean="0"/>
+                        <a:t>Greater than equal to</a:t>
+                      </a:r>
+                      <a:r>
+                        <a:rPr lang="en-US" baseline="0" dirty="0" smtClean="0"/>
+                        <a:t> check</a:t>
+                      </a:r>
+                      <a:endParaRPr lang="en-US" dirty="0"/>
+                    </a:p>
+                  </a:txBody>
+                  <a:tcPr/>
+                </a:tc>
+              </a:tr>
+            </a:tbl>
+          </a:graphicData>
+        </a:graphic>
+      </p:graphicFrame>
     </p:spTree>
     <p:extLst>
       <p:ext uri="{BB962C8B-B14F-4D97-AF65-F5344CB8AC3E}">
@@ -5615,38 +6480,6 @@
           <a:chExt cx="0" cy="0"/>
         </a:xfrm>
       </p:grpSpPr>
-      <p:pic>
-        <p:nvPicPr>
-          <p:cNvPr id="2" name="Picture 1"/>
-          <p:cNvPicPr>
-            <a:picLocks noChangeAspect="1"/>
-          </p:cNvPicPr>
-          <p:nvPr/>
-        </p:nvPicPr>
-        <p:blipFill>
-          <a:blip r:embed="rId2">
-            <a:lum bright="-50000"/>
-            <a:alphaModFix/>
-          </a:blip>
-          <a:srcRect/>
-          <a:stretch>
-            <a:fillRect/>
-          </a:stretch>
-        </p:blipFill>
-        <p:spPr>
-          <a:xfrm>
-            <a:off x="388407" y="2042278"/>
-            <a:ext cx="5516019" cy="2980097"/>
-          </a:xfrm>
-          <a:prstGeom prst="rect">
-            <a:avLst/>
-          </a:prstGeom>
-          <a:noFill/>
-          <a:ln>
-            <a:noFill/>
-          </a:ln>
-        </p:spPr>
-      </p:pic>
       <p:sp>
         <p:nvSpPr>
           <p:cNvPr id="3" name="Freeform 2"/>
@@ -6312,6 +7145,279 @@
           </a:p>
         </p:txBody>
       </p:sp>
+      <p:pic>
+        <p:nvPicPr>
+          <p:cNvPr id="5" name="Picture 2" descr="https://s-media-cache-ak0.pinimg.com/736x/58/df/35/58df3549ac4993bc85b985d37e5b3e24.jpg"/>
+          <p:cNvPicPr>
+            <a:picLocks noChangeAspect="1" noChangeArrowheads="1"/>
+          </p:cNvPicPr>
+          <p:nvPr/>
+        </p:nvPicPr>
+        <p:blipFill>
+          <a:blip r:embed="rId2" cstate="print">
+            <a:extLst>
+              <a:ext uri="{28A0092B-C50C-407E-A947-70E740481C1C}">
+                <a14:useLocalDpi xmlns:a14="http://schemas.microsoft.com/office/drawing/2010/main" val="0"/>
+              </a:ext>
+            </a:extLst>
+          </a:blip>
+          <a:srcRect/>
+          <a:stretch>
+            <a:fillRect/>
+          </a:stretch>
+        </p:blipFill>
+        <p:spPr bwMode="auto">
+          <a:xfrm>
+            <a:off x="9799093" y="576859"/>
+            <a:ext cx="1774210" cy="1685018"/>
+          </a:xfrm>
+          <a:prstGeom prst="rect">
+            <a:avLst/>
+          </a:prstGeom>
+          <a:noFill/>
+          <a:extLst>
+            <a:ext uri="{909E8E84-426E-40DD-AFC4-6F175D3DCCD1}">
+              <a14:hiddenFill xmlns:a14="http://schemas.microsoft.com/office/drawing/2010/main">
+                <a:solidFill>
+                  <a:srgbClr val="FFFFFF"/>
+                </a:solidFill>
+              </a14:hiddenFill>
+            </a:ext>
+          </a:extLst>
+        </p:spPr>
+      </p:pic>
+      <p:graphicFrame>
+        <p:nvGraphicFramePr>
+          <p:cNvPr id="6" name="Table 5"/>
+          <p:cNvGraphicFramePr>
+            <a:graphicFrameLocks noGrp="1"/>
+          </p:cNvGraphicFramePr>
+          <p:nvPr>
+            <p:extLst>
+              <p:ext uri="{D42A27DB-BD31-4B8C-83A1-F6EECF244321}">
+                <p14:modId xmlns:p14="http://schemas.microsoft.com/office/powerpoint/2010/main" val="3581268283"/>
+              </p:ext>
+            </p:extLst>
+          </p:nvPr>
+        </p:nvGraphicFramePr>
+        <p:xfrm>
+          <a:off x="558042" y="2261877"/>
+          <a:ext cx="5583450" cy="2194560"/>
+        </p:xfrm>
+        <a:graphic>
+          <a:graphicData uri="http://schemas.openxmlformats.org/drawingml/2006/table">
+            <a:tbl>
+              <a:tblPr firstRow="1" bandRow="1">
+                <a:tableStyleId>{5C22544A-7EE6-4342-B048-85BDC9FD1C3A}</a:tableStyleId>
+              </a:tblPr>
+              <a:tblGrid>
+                <a:gridCol w="2458113"/>
+                <a:gridCol w="3125337"/>
+              </a:tblGrid>
+              <a:tr h="293500">
+                <a:tc>
+                  <a:txBody>
+                    <a:bodyPr/>
+                    <a:lstStyle/>
+                    <a:p>
+                      <a:r>
+                        <a:rPr lang="en-US" dirty="0" smtClean="0"/>
+                        <a:t>Arithmetic Operators</a:t>
+                      </a:r>
+                      <a:endParaRPr lang="en-US" dirty="0"/>
+                    </a:p>
+                  </a:txBody>
+                  <a:tcPr/>
+                </a:tc>
+                <a:tc>
+                  <a:txBody>
+                    <a:bodyPr/>
+                    <a:lstStyle/>
+                    <a:p>
+                      <a:r>
+                        <a:rPr lang="en-US" dirty="0" smtClean="0"/>
+                        <a:t>Explanation</a:t>
+                      </a:r>
+                      <a:endParaRPr lang="en-US" dirty="0"/>
+                    </a:p>
+                  </a:txBody>
+                  <a:tcPr/>
+                </a:tc>
+              </a:tr>
+              <a:tr h="293500">
+                <a:tc>
+                  <a:txBody>
+                    <a:bodyPr/>
+                    <a:lstStyle/>
+                    <a:p>
+                      <a:r>
+                        <a:rPr lang="en-US" dirty="0" smtClean="0"/>
+                        <a:t>add</a:t>
+                      </a:r>
+                      <a:endParaRPr lang="en-US" dirty="0"/>
+                    </a:p>
+                  </a:txBody>
+                  <a:tcPr anchor="ctr"/>
+                </a:tc>
+                <a:tc>
+                  <a:txBody>
+                    <a:bodyPr/>
+                    <a:lstStyle/>
+                    <a:p>
+                      <a:r>
+                        <a:rPr lang="en-US" dirty="0" smtClean="0"/>
+                        <a:t>Addition</a:t>
+                      </a:r>
+                      <a:r>
+                        <a:rPr lang="en-US" baseline="0" dirty="0" smtClean="0"/>
+                        <a:t> </a:t>
+                      </a:r>
+                      <a:r>
+                        <a:rPr lang="en-US" dirty="0" smtClean="0"/>
+                        <a:t>operation</a:t>
+                      </a:r>
+                      <a:endParaRPr lang="en-US" dirty="0"/>
+                    </a:p>
+                  </a:txBody>
+                  <a:tcPr anchor="ctr"/>
+                </a:tc>
+              </a:tr>
+              <a:tr h="293500">
+                <a:tc>
+                  <a:txBody>
+                    <a:bodyPr/>
+                    <a:lstStyle/>
+                    <a:p>
+                      <a:r>
+                        <a:rPr lang="en-US" dirty="0" smtClean="0"/>
+                        <a:t>sub</a:t>
+                      </a:r>
+                      <a:endParaRPr lang="en-US" dirty="0"/>
+                    </a:p>
+                  </a:txBody>
+                  <a:tcPr anchor="ctr"/>
+                </a:tc>
+                <a:tc>
+                  <a:txBody>
+                    <a:bodyPr/>
+                    <a:lstStyle/>
+                    <a:p>
+                      <a:r>
+                        <a:rPr lang="en-US" dirty="0" smtClean="0"/>
+                        <a:t>Subtraction </a:t>
+                      </a:r>
+                      <a:r>
+                        <a:rPr lang="en-US" dirty="0" smtClean="0"/>
+                        <a:t>operation</a:t>
+                      </a:r>
+                      <a:endParaRPr lang="en-US" dirty="0"/>
+                    </a:p>
+                  </a:txBody>
+                  <a:tcPr anchor="ctr"/>
+                </a:tc>
+              </a:tr>
+              <a:tr h="293500">
+                <a:tc>
+                  <a:txBody>
+                    <a:bodyPr/>
+                    <a:lstStyle/>
+                    <a:p>
+                      <a:r>
+                        <a:rPr lang="en-US" dirty="0" err="1" smtClean="0"/>
+                        <a:t>mul</a:t>
+                      </a:r>
+                      <a:endParaRPr lang="en-US" dirty="0"/>
+                    </a:p>
+                  </a:txBody>
+                  <a:tcPr anchor="ctr"/>
+                </a:tc>
+                <a:tc>
+                  <a:txBody>
+                    <a:bodyPr/>
+                    <a:lstStyle/>
+                    <a:p>
+                      <a:r>
+                        <a:rPr lang="en-US" dirty="0" smtClean="0"/>
+                        <a:t>Multiplication </a:t>
+                      </a:r>
+                      <a:r>
+                        <a:rPr lang="en-US" dirty="0" smtClean="0"/>
+                        <a:t>operation</a:t>
+                      </a:r>
+                      <a:endParaRPr lang="en-US" dirty="0"/>
+                    </a:p>
+                  </a:txBody>
+                  <a:tcPr anchor="ctr"/>
+                </a:tc>
+              </a:tr>
+              <a:tr h="293500">
+                <a:tc>
+                  <a:txBody>
+                    <a:bodyPr/>
+                    <a:lstStyle/>
+                    <a:p>
+                      <a:r>
+                        <a:rPr lang="en-US" dirty="0" smtClean="0"/>
+                        <a:t>div</a:t>
+                      </a:r>
+                      <a:endParaRPr lang="en-US" dirty="0"/>
+                    </a:p>
+                  </a:txBody>
+                  <a:tcPr anchor="ctr"/>
+                </a:tc>
+                <a:tc>
+                  <a:txBody>
+                    <a:bodyPr/>
+                    <a:lstStyle/>
+                    <a:p>
+                      <a:r>
+                        <a:rPr lang="en-US" dirty="0" smtClean="0"/>
+                        <a:t>Division </a:t>
+                      </a:r>
+                      <a:r>
+                        <a:rPr lang="en-US" dirty="0" smtClean="0"/>
+                        <a:t>operation</a:t>
+                      </a:r>
+                      <a:endParaRPr lang="en-US" dirty="0"/>
+                    </a:p>
+                  </a:txBody>
+                  <a:tcPr anchor="ctr"/>
+                </a:tc>
+              </a:tr>
+              <a:tr h="293500">
+                <a:tc>
+                  <a:txBody>
+                    <a:bodyPr/>
+                    <a:lstStyle/>
+                    <a:p>
+                      <a:r>
+                        <a:rPr lang="en-US" dirty="0" smtClean="0"/>
+                        <a:t>mod</a:t>
+                      </a:r>
+                      <a:endParaRPr lang="en-US" dirty="0"/>
+                    </a:p>
+                  </a:txBody>
+                  <a:tcPr anchor="ctr"/>
+                </a:tc>
+                <a:tc>
+                  <a:txBody>
+                    <a:bodyPr/>
+                    <a:lstStyle/>
+                    <a:p>
+                      <a:r>
+                        <a:rPr lang="en-US" dirty="0" smtClean="0"/>
+                        <a:t>Modulo  operation</a:t>
+                      </a:r>
+                      <a:endParaRPr lang="en-US" dirty="0"/>
+                    </a:p>
+                  </a:txBody>
+                  <a:tcPr anchor="ctr"/>
+                </a:tc>
+              </a:tr>
+            </a:tbl>
+          </a:graphicData>
+        </a:graphic>
+      </p:graphicFrame>
     </p:spTree>
     <p:extLst>
       <p:ext uri="{BB962C8B-B14F-4D97-AF65-F5344CB8AC3E}">
@@ -7556,38 +8662,6 @@
           </a:p>
         </p:txBody>
       </p:sp>
-      <p:pic>
-        <p:nvPicPr>
-          <p:cNvPr id="3" name="Picture 2"/>
-          <p:cNvPicPr>
-            <a:picLocks noChangeAspect="1"/>
-          </p:cNvPicPr>
-          <p:nvPr/>
-        </p:nvPicPr>
-        <p:blipFill>
-          <a:blip r:embed="rId2">
-            <a:lum bright="-50000"/>
-            <a:alphaModFix/>
-          </a:blip>
-          <a:srcRect/>
-          <a:stretch>
-            <a:fillRect/>
-          </a:stretch>
-        </p:blipFill>
-        <p:spPr>
-          <a:xfrm>
-            <a:off x="401301" y="2025339"/>
-            <a:ext cx="4047423" cy="3542947"/>
-          </a:xfrm>
-          <a:prstGeom prst="rect">
-            <a:avLst/>
-          </a:prstGeom>
-          <a:noFill/>
-          <a:ln>
-            <a:noFill/>
-          </a:ln>
-        </p:spPr>
-      </p:pic>
       <p:sp>
         <p:nvSpPr>
           <p:cNvPr id="4" name="Rectangle 3"/>
@@ -7651,6 +8725,219 @@
           </a:p>
         </p:txBody>
       </p:sp>
+      <p:pic>
+        <p:nvPicPr>
+          <p:cNvPr id="5" name="Picture 2" descr="https://s-media-cache-ak0.pinimg.com/736x/58/df/35/58df3549ac4993bc85b985d37e5b3e24.jpg"/>
+          <p:cNvPicPr>
+            <a:picLocks noChangeAspect="1" noChangeArrowheads="1"/>
+          </p:cNvPicPr>
+          <p:nvPr/>
+        </p:nvPicPr>
+        <p:blipFill>
+          <a:blip r:embed="rId2" cstate="print">
+            <a:extLst>
+              <a:ext uri="{28A0092B-C50C-407E-A947-70E740481C1C}">
+                <a14:useLocalDpi xmlns:a14="http://schemas.microsoft.com/office/drawing/2010/main" val="0"/>
+              </a:ext>
+            </a:extLst>
+          </a:blip>
+          <a:srcRect/>
+          <a:stretch>
+            <a:fillRect/>
+          </a:stretch>
+        </p:blipFill>
+        <p:spPr bwMode="auto">
+          <a:xfrm>
+            <a:off x="10031105" y="340321"/>
+            <a:ext cx="1774210" cy="1685018"/>
+          </a:xfrm>
+          <a:prstGeom prst="rect">
+            <a:avLst/>
+          </a:prstGeom>
+          <a:noFill/>
+          <a:extLst>
+            <a:ext uri="{909E8E84-426E-40DD-AFC4-6F175D3DCCD1}">
+              <a14:hiddenFill xmlns:a14="http://schemas.microsoft.com/office/drawing/2010/main">
+                <a:solidFill>
+                  <a:srgbClr val="FFFFFF"/>
+                </a:solidFill>
+              </a14:hiddenFill>
+            </a:ext>
+          </a:extLst>
+        </p:spPr>
+      </p:pic>
+      <p:graphicFrame>
+        <p:nvGraphicFramePr>
+          <p:cNvPr id="7" name="Table 6"/>
+          <p:cNvGraphicFramePr>
+            <a:graphicFrameLocks noGrp="1"/>
+          </p:cNvGraphicFramePr>
+          <p:nvPr>
+            <p:extLst>
+              <p:ext uri="{D42A27DB-BD31-4B8C-83A1-F6EECF244321}">
+                <p14:modId xmlns:p14="http://schemas.microsoft.com/office/powerpoint/2010/main" val="286645685"/>
+              </p:ext>
+            </p:extLst>
+          </p:nvPr>
+        </p:nvGraphicFramePr>
+        <p:xfrm>
+          <a:off x="558042" y="2214388"/>
+          <a:ext cx="4218675" cy="3149754"/>
+        </p:xfrm>
+        <a:graphic>
+          <a:graphicData uri="http://schemas.openxmlformats.org/drawingml/2006/table">
+            <a:tbl>
+              <a:tblPr firstRow="1" bandRow="1">
+                <a:tableStyleId>{5C22544A-7EE6-4342-B048-85BDC9FD1C3A}</a:tableStyleId>
+              </a:tblPr>
+              <a:tblGrid>
+                <a:gridCol w="4218675"/>
+              </a:tblGrid>
+              <a:tr h="448759">
+                <a:tc>
+                  <a:txBody>
+                    <a:bodyPr/>
+                    <a:lstStyle/>
+                    <a:p>
+                      <a:pPr algn="ctr"/>
+                      <a:r>
+                        <a:rPr lang="en-US" sz="2400" dirty="0" smtClean="0"/>
+                        <a:t>String Functions</a:t>
+                      </a:r>
+                      <a:endParaRPr lang="en-US" dirty="0"/>
+                    </a:p>
+                  </a:txBody>
+                  <a:tcPr/>
+                </a:tc>
+              </a:tr>
+              <a:tr h="448759">
+                <a:tc>
+                  <a:txBody>
+                    <a:bodyPr/>
+                    <a:lstStyle/>
+                    <a:p>
+                      <a:r>
+                        <a:rPr lang="en-US" dirty="0" smtClean="0"/>
+                        <a:t>substring, </a:t>
+                      </a:r>
+                      <a:r>
+                        <a:rPr lang="en-US" dirty="0" err="1" smtClean="0"/>
+                        <a:t>substringof</a:t>
+                      </a:r>
+                      <a:endParaRPr lang="en-US" dirty="0"/>
+                    </a:p>
+                  </a:txBody>
+                  <a:tcPr anchor="ctr"/>
+                </a:tc>
+              </a:tr>
+              <a:tr h="448759">
+                <a:tc>
+                  <a:txBody>
+                    <a:bodyPr/>
+                    <a:lstStyle/>
+                    <a:p>
+                      <a:r>
+                        <a:rPr lang="en-US" dirty="0" smtClean="0"/>
+                        <a:t>length, </a:t>
+                      </a:r>
+                      <a:r>
+                        <a:rPr lang="en-US" dirty="0" err="1" smtClean="0"/>
+                        <a:t>indexof</a:t>
+                      </a:r>
+                      <a:endParaRPr lang="en-US" dirty="0"/>
+                    </a:p>
+                  </a:txBody>
+                  <a:tcPr anchor="ctr"/>
+                </a:tc>
+              </a:tr>
+              <a:tr h="448759">
+                <a:tc>
+                  <a:txBody>
+                    <a:bodyPr/>
+                    <a:lstStyle/>
+                    <a:p>
+                      <a:r>
+                        <a:rPr lang="en-US" dirty="0" err="1" smtClean="0"/>
+                        <a:t>startswith</a:t>
+                      </a:r>
+                      <a:r>
+                        <a:rPr lang="en-US" dirty="0" smtClean="0"/>
+                        <a:t>, </a:t>
+                      </a:r>
+                      <a:r>
+                        <a:rPr lang="en-US" dirty="0" err="1" smtClean="0"/>
+                        <a:t>endswith</a:t>
+                      </a:r>
+                      <a:endParaRPr lang="en-US" dirty="0"/>
+                    </a:p>
+                  </a:txBody>
+                  <a:tcPr anchor="ctr"/>
+                </a:tc>
+              </a:tr>
+              <a:tr h="448759">
+                <a:tc>
+                  <a:txBody>
+                    <a:bodyPr/>
+                    <a:lstStyle/>
+                    <a:p>
+                      <a:r>
+                        <a:rPr lang="en-US" dirty="0" smtClean="0"/>
+                        <a:t>insert, remove, replace</a:t>
+                      </a:r>
+                      <a:endParaRPr lang="en-US" dirty="0"/>
+                    </a:p>
+                  </a:txBody>
+                  <a:tcPr anchor="ctr"/>
+                </a:tc>
+              </a:tr>
+              <a:tr h="448759">
+                <a:tc>
+                  <a:txBody>
+                    <a:bodyPr/>
+                    <a:lstStyle/>
+                    <a:p>
+                      <a:r>
+                        <a:rPr lang="en-US" dirty="0" err="1" smtClean="0"/>
+                        <a:t>tolower</a:t>
+                      </a:r>
+                      <a:r>
+                        <a:rPr lang="en-US" dirty="0" smtClean="0"/>
+                        <a:t>, </a:t>
+                      </a:r>
+                      <a:r>
+                        <a:rPr lang="en-US" dirty="0" err="1" smtClean="0"/>
+                        <a:t>toupper</a:t>
+                      </a:r>
+                      <a:endParaRPr lang="en-US" dirty="0"/>
+                    </a:p>
+                  </a:txBody>
+                  <a:tcPr anchor="ctr"/>
+                </a:tc>
+              </a:tr>
+              <a:tr h="448759">
+                <a:tc>
+                  <a:txBody>
+                    <a:bodyPr/>
+                    <a:lstStyle/>
+                    <a:p>
+                      <a:r>
+                        <a:rPr lang="en-US" dirty="0" err="1" smtClean="0"/>
+                        <a:t>concat</a:t>
+                      </a:r>
+                      <a:r>
+                        <a:rPr lang="en-US" dirty="0" smtClean="0"/>
+                        <a:t>, trim</a:t>
+                      </a:r>
+                      <a:endParaRPr lang="en-US" dirty="0"/>
+                    </a:p>
+                  </a:txBody>
+                  <a:tcPr anchor="ctr"/>
+                </a:tc>
+              </a:tr>
+            </a:tbl>
+          </a:graphicData>
+        </a:graphic>
+      </p:graphicFrame>
     </p:spTree>
     <p:extLst>
       <p:ext uri="{BB962C8B-B14F-4D97-AF65-F5344CB8AC3E}">
@@ -8120,7 +9407,7 @@
         </p:nvSpPr>
         <p:spPr>
           <a:xfrm>
-            <a:off x="4252459" y="2838162"/>
+            <a:off x="5197776" y="2851810"/>
             <a:ext cx="6351851" cy="2011320"/>
           </a:xfrm>
           <a:custGeom>
@@ -8586,36 +9873,188 @@
       </p:sp>
       <p:pic>
         <p:nvPicPr>
-          <p:cNvPr id="5" name="Picture 4"/>
+          <p:cNvPr id="6" name="Picture 2" descr="https://s-media-cache-ak0.pinimg.com/736x/58/df/35/58df3549ac4993bc85b985d37e5b3e24.jpg"/>
           <p:cNvPicPr>
-            <a:picLocks noChangeAspect="1"/>
+            <a:picLocks noChangeAspect="1" noChangeArrowheads="1"/>
           </p:cNvPicPr>
           <p:nvPr/>
         </p:nvPicPr>
         <p:blipFill>
-          <a:blip r:embed="rId2">
-            <a:lum bright="-50000"/>
-            <a:alphaModFix/>
+          <a:blip r:embed="rId2" cstate="print">
+            <a:extLst>
+              <a:ext uri="{28A0092B-C50C-407E-A947-70E740481C1C}">
+                <a14:useLocalDpi xmlns:a14="http://schemas.microsoft.com/office/drawing/2010/main" val="0"/>
+              </a:ext>
+            </a:extLst>
           </a:blip>
           <a:srcRect/>
           <a:stretch>
             <a:fillRect/>
           </a:stretch>
         </p:blipFill>
-        <p:spPr>
+        <p:spPr bwMode="auto">
           <a:xfrm>
-            <a:off x="605787" y="1815554"/>
-            <a:ext cx="3010870" cy="3313621"/>
+            <a:off x="9717205" y="560775"/>
+            <a:ext cx="1774210" cy="1685018"/>
           </a:xfrm>
           <a:prstGeom prst="rect">
             <a:avLst/>
           </a:prstGeom>
           <a:noFill/>
-          <a:ln>
-            <a:noFill/>
-          </a:ln>
+          <a:extLst>
+            <a:ext uri="{909E8E84-426E-40DD-AFC4-6F175D3DCCD1}">
+              <a14:hiddenFill xmlns:a14="http://schemas.microsoft.com/office/drawing/2010/main">
+                <a:solidFill>
+                  <a:srgbClr val="FFFFFF"/>
+                </a:solidFill>
+              </a14:hiddenFill>
+            </a:ext>
+          </a:extLst>
         </p:spPr>
       </p:pic>
+      <p:graphicFrame>
+        <p:nvGraphicFramePr>
+          <p:cNvPr id="7" name="Table 6"/>
+          <p:cNvGraphicFramePr>
+            <a:graphicFrameLocks noGrp="1"/>
+          </p:cNvGraphicFramePr>
+          <p:nvPr>
+            <p:extLst>
+              <p:ext uri="{D42A27DB-BD31-4B8C-83A1-F6EECF244321}">
+                <p14:modId xmlns:p14="http://schemas.microsoft.com/office/powerpoint/2010/main" val="1480096029"/>
+              </p:ext>
+            </p:extLst>
+          </p:nvPr>
+        </p:nvGraphicFramePr>
+        <p:xfrm>
+          <a:off x="1036380" y="2416631"/>
+          <a:ext cx="3850185" cy="2560320"/>
+        </p:xfrm>
+        <a:graphic>
+          <a:graphicData uri="http://schemas.openxmlformats.org/drawingml/2006/table">
+            <a:tbl>
+              <a:tblPr firstRow="1" bandRow="1">
+                <a:tableStyleId>{5C22544A-7EE6-4342-B048-85BDC9FD1C3A}</a:tableStyleId>
+              </a:tblPr>
+              <a:tblGrid>
+                <a:gridCol w="3850185"/>
+              </a:tblGrid>
+              <a:tr h="334978">
+                <a:tc>
+                  <a:txBody>
+                    <a:bodyPr/>
+                    <a:lstStyle/>
+                    <a:p>
+                      <a:r>
+                        <a:rPr lang="en-US" dirty="0" smtClean="0"/>
+                        <a:t>Date Functions</a:t>
+                      </a:r>
+                      <a:endParaRPr lang="en-US" dirty="0"/>
+                    </a:p>
+                  </a:txBody>
+                  <a:tcPr/>
+                </a:tc>
+              </a:tr>
+              <a:tr h="334978">
+                <a:tc>
+                  <a:txBody>
+                    <a:bodyPr/>
+                    <a:lstStyle/>
+                    <a:p>
+                      <a:r>
+                        <a:rPr lang="en-US" dirty="0" smtClean="0"/>
+                        <a:t>hour</a:t>
+                      </a:r>
+                      <a:endParaRPr lang="en-US" dirty="0"/>
+                    </a:p>
+                  </a:txBody>
+                  <a:tcPr/>
+                </a:tc>
+              </a:tr>
+              <a:tr h="334978">
+                <a:tc>
+                  <a:txBody>
+                    <a:bodyPr/>
+                    <a:lstStyle/>
+                    <a:p>
+                      <a:r>
+                        <a:rPr lang="en-US" dirty="0" smtClean="0"/>
+                        <a:t>minute</a:t>
+                      </a:r>
+                      <a:endParaRPr lang="en-US" dirty="0"/>
+                    </a:p>
+                  </a:txBody>
+                  <a:tcPr/>
+                </a:tc>
+              </a:tr>
+              <a:tr h="334978">
+                <a:tc>
+                  <a:txBody>
+                    <a:bodyPr/>
+                    <a:lstStyle/>
+                    <a:p>
+                      <a:r>
+                        <a:rPr lang="en-US" dirty="0" smtClean="0"/>
+                        <a:t>second</a:t>
+                      </a:r>
+                      <a:endParaRPr lang="en-US" dirty="0"/>
+                    </a:p>
+                  </a:txBody>
+                  <a:tcPr/>
+                </a:tc>
+              </a:tr>
+              <a:tr h="334978">
+                <a:tc>
+                  <a:txBody>
+                    <a:bodyPr/>
+                    <a:lstStyle/>
+                    <a:p>
+                      <a:r>
+                        <a:rPr lang="en-US" dirty="0" smtClean="0"/>
+                        <a:t>day</a:t>
+                      </a:r>
+                      <a:endParaRPr lang="en-US" dirty="0"/>
+                    </a:p>
+                  </a:txBody>
+                  <a:tcPr/>
+                </a:tc>
+              </a:tr>
+              <a:tr h="334978">
+                <a:tc>
+                  <a:txBody>
+                    <a:bodyPr/>
+                    <a:lstStyle/>
+                    <a:p>
+                      <a:r>
+                        <a:rPr lang="en-US" dirty="0" smtClean="0"/>
+                        <a:t>month</a:t>
+                      </a:r>
+                      <a:endParaRPr lang="en-US" dirty="0"/>
+                    </a:p>
+                  </a:txBody>
+                  <a:tcPr/>
+                </a:tc>
+              </a:tr>
+              <a:tr h="334978">
+                <a:tc>
+                  <a:txBody>
+                    <a:bodyPr/>
+                    <a:lstStyle/>
+                    <a:p>
+                      <a:r>
+                        <a:rPr lang="en-US" dirty="0" smtClean="0"/>
+                        <a:t>year</a:t>
+                      </a:r>
+                      <a:endParaRPr lang="en-US" dirty="0"/>
+                    </a:p>
+                  </a:txBody>
+                  <a:tcPr/>
+                </a:tc>
+              </a:tr>
+            </a:tbl>
+          </a:graphicData>
+        </a:graphic>
+      </p:graphicFrame>
     </p:spTree>
     <p:extLst>
       <p:ext uri="{BB962C8B-B14F-4D97-AF65-F5344CB8AC3E}">
@@ -9224,38 +10663,6 @@
           </a:p>
         </p:txBody>
       </p:sp>
-      <p:pic>
-        <p:nvPicPr>
-          <p:cNvPr id="3" name="Picture 2"/>
-          <p:cNvPicPr>
-            <a:picLocks noChangeAspect="1"/>
-          </p:cNvPicPr>
-          <p:nvPr/>
-        </p:nvPicPr>
-        <p:blipFill>
-          <a:blip r:embed="rId2">
-            <a:lum bright="-50000"/>
-            <a:alphaModFix/>
-          </a:blip>
-          <a:srcRect/>
-          <a:stretch>
-            <a:fillRect/>
-          </a:stretch>
-        </p:blipFill>
-        <p:spPr>
-          <a:xfrm>
-            <a:off x="626147" y="2337510"/>
-            <a:ext cx="2412243" cy="2412243"/>
-          </a:xfrm>
-          <a:prstGeom prst="rect">
-            <a:avLst/>
-          </a:prstGeom>
-          <a:noFill/>
-          <a:ln>
-            <a:noFill/>
-          </a:ln>
-        </p:spPr>
-      </p:pic>
       <p:sp>
         <p:nvSpPr>
           <p:cNvPr id="4" name="Rectangle 3"/>
@@ -9319,6 +10726,143 @@
           </a:p>
         </p:txBody>
       </p:sp>
+      <p:pic>
+        <p:nvPicPr>
+          <p:cNvPr id="5" name="Picture 2" descr="https://s-media-cache-ak0.pinimg.com/736x/58/df/35/58df3549ac4993bc85b985d37e5b3e24.jpg"/>
+          <p:cNvPicPr>
+            <a:picLocks noChangeAspect="1" noChangeArrowheads="1"/>
+          </p:cNvPicPr>
+          <p:nvPr/>
+        </p:nvPicPr>
+        <p:blipFill>
+          <a:blip r:embed="rId2" cstate="print">
+            <a:extLst>
+              <a:ext uri="{28A0092B-C50C-407E-A947-70E740481C1C}">
+                <a14:useLocalDpi xmlns:a14="http://schemas.microsoft.com/office/drawing/2010/main" val="0"/>
+              </a:ext>
+            </a:extLst>
+          </a:blip>
+          <a:srcRect/>
+          <a:stretch>
+            <a:fillRect/>
+          </a:stretch>
+        </p:blipFill>
+        <p:spPr bwMode="auto">
+          <a:xfrm>
+            <a:off x="9471546" y="652492"/>
+            <a:ext cx="1774210" cy="1685018"/>
+          </a:xfrm>
+          <a:prstGeom prst="rect">
+            <a:avLst/>
+          </a:prstGeom>
+          <a:noFill/>
+          <a:extLst>
+            <a:ext uri="{909E8E84-426E-40DD-AFC4-6F175D3DCCD1}">
+              <a14:hiddenFill xmlns:a14="http://schemas.microsoft.com/office/drawing/2010/main">
+                <a:solidFill>
+                  <a:srgbClr val="FFFFFF"/>
+                </a:solidFill>
+              </a14:hiddenFill>
+            </a:ext>
+          </a:extLst>
+        </p:spPr>
+      </p:pic>
+      <p:graphicFrame>
+        <p:nvGraphicFramePr>
+          <p:cNvPr id="6" name="Table 5"/>
+          <p:cNvGraphicFramePr>
+            <a:graphicFrameLocks noGrp="1"/>
+          </p:cNvGraphicFramePr>
+          <p:nvPr>
+            <p:extLst>
+              <p:ext uri="{D42A27DB-BD31-4B8C-83A1-F6EECF244321}">
+                <p14:modId xmlns:p14="http://schemas.microsoft.com/office/powerpoint/2010/main" val="582224237"/>
+              </p:ext>
+            </p:extLst>
+          </p:nvPr>
+        </p:nvGraphicFramePr>
+        <p:xfrm>
+          <a:off x="626147" y="2379164"/>
+          <a:ext cx="2785793" cy="1560584"/>
+        </p:xfrm>
+        <a:graphic>
+          <a:graphicData uri="http://schemas.openxmlformats.org/drawingml/2006/table">
+            <a:tbl>
+              <a:tblPr firstRow="1" bandRow="1">
+                <a:tableStyleId>{5C22544A-7EE6-4342-B048-85BDC9FD1C3A}</a:tableStyleId>
+              </a:tblPr>
+              <a:tblGrid>
+                <a:gridCol w="2785793"/>
+              </a:tblGrid>
+              <a:tr h="390146">
+                <a:tc>
+                  <a:txBody>
+                    <a:bodyPr/>
+                    <a:lstStyle/>
+                    <a:p>
+                      <a:pPr algn="l"/>
+                      <a:r>
+                        <a:rPr lang="en-US" dirty="0" smtClean="0"/>
+                        <a:t>Math Functions</a:t>
+                      </a:r>
+                      <a:endParaRPr lang="en-US" dirty="0"/>
+                    </a:p>
+                  </a:txBody>
+                  <a:tcPr/>
+                </a:tc>
+              </a:tr>
+              <a:tr h="390146">
+                <a:tc>
+                  <a:txBody>
+                    <a:bodyPr/>
+                    <a:lstStyle/>
+                    <a:p>
+                      <a:r>
+                        <a:rPr lang="en-US" dirty="0" smtClean="0"/>
+                        <a:t>round</a:t>
+                      </a:r>
+                      <a:endParaRPr lang="en-US" dirty="0"/>
+                    </a:p>
+                  </a:txBody>
+                  <a:tcPr/>
+                </a:tc>
+              </a:tr>
+              <a:tr h="390146">
+                <a:tc>
+                  <a:txBody>
+                    <a:bodyPr/>
+                    <a:lstStyle/>
+                    <a:p>
+                      <a:r>
+                        <a:rPr lang="en-US" dirty="0" smtClean="0"/>
+                        <a:t>floor</a:t>
+                      </a:r>
+                      <a:endParaRPr lang="en-US" dirty="0"/>
+                    </a:p>
+                  </a:txBody>
+                  <a:tcPr/>
+                </a:tc>
+              </a:tr>
+              <a:tr h="390146">
+                <a:tc>
+                  <a:txBody>
+                    <a:bodyPr/>
+                    <a:lstStyle/>
+                    <a:p>
+                      <a:r>
+                        <a:rPr lang="en-US" dirty="0" smtClean="0"/>
+                        <a:t>ceiling</a:t>
+                      </a:r>
+                      <a:endParaRPr lang="en-US" dirty="0"/>
+                    </a:p>
+                  </a:txBody>
+                  <a:tcPr/>
+                </a:tc>
+              </a:tr>
+            </a:tbl>
+          </a:graphicData>
+        </a:graphic>
+      </p:graphicFrame>
     </p:spTree>
     <p:extLst>
       <p:ext uri="{BB962C8B-B14F-4D97-AF65-F5344CB8AC3E}">
@@ -10222,6 +11766,47 @@
           </a:p>
         </p:txBody>
       </p:sp>
+      <p:pic>
+        <p:nvPicPr>
+          <p:cNvPr id="4" name="Picture 2" descr="https://s-media-cache-ak0.pinimg.com/736x/58/df/35/58df3549ac4993bc85b985d37e5b3e24.jpg"/>
+          <p:cNvPicPr>
+            <a:picLocks noChangeAspect="1" noChangeArrowheads="1"/>
+          </p:cNvPicPr>
+          <p:nvPr/>
+        </p:nvPicPr>
+        <p:blipFill>
+          <a:blip r:embed="rId2" cstate="print">
+            <a:extLst>
+              <a:ext uri="{28A0092B-C50C-407E-A947-70E740481C1C}">
+                <a14:useLocalDpi xmlns:a14="http://schemas.microsoft.com/office/drawing/2010/main" val="0"/>
+              </a:ext>
+            </a:extLst>
+          </a:blip>
+          <a:srcRect/>
+          <a:stretch>
+            <a:fillRect/>
+          </a:stretch>
+        </p:blipFill>
+        <p:spPr bwMode="auto">
+          <a:xfrm>
+            <a:off x="9935571" y="583514"/>
+            <a:ext cx="1774210" cy="1685018"/>
+          </a:xfrm>
+          <a:prstGeom prst="rect">
+            <a:avLst/>
+          </a:prstGeom>
+          <a:noFill/>
+          <a:extLst>
+            <a:ext uri="{909E8E84-426E-40DD-AFC4-6F175D3DCCD1}">
+              <a14:hiddenFill xmlns:a14="http://schemas.microsoft.com/office/drawing/2010/main">
+                <a:solidFill>
+                  <a:srgbClr val="FFFFFF"/>
+                </a:solidFill>
+              </a14:hiddenFill>
+            </a:ext>
+          </a:extLst>
+        </p:spPr>
+      </p:pic>
     </p:spTree>
     <p:extLst>
       <p:ext uri="{BB962C8B-B14F-4D97-AF65-F5344CB8AC3E}">
@@ -10370,6 +11955,47 @@
           </a:p>
         </p:txBody>
       </p:sp>
+      <p:pic>
+        <p:nvPicPr>
+          <p:cNvPr id="4" name="Picture 2" descr="https://s-media-cache-ak0.pinimg.com/736x/58/df/35/58df3549ac4993bc85b985d37e5b3e24.jpg"/>
+          <p:cNvPicPr>
+            <a:picLocks noChangeAspect="1" noChangeArrowheads="1"/>
+          </p:cNvPicPr>
+          <p:nvPr/>
+        </p:nvPicPr>
+        <p:blipFill>
+          <a:blip r:embed="rId4" cstate="print">
+            <a:extLst>
+              <a:ext uri="{28A0092B-C50C-407E-A947-70E740481C1C}">
+                <a14:useLocalDpi xmlns:a14="http://schemas.microsoft.com/office/drawing/2010/main" val="0"/>
+              </a:ext>
+            </a:extLst>
+          </a:blip>
+          <a:srcRect/>
+          <a:stretch>
+            <a:fillRect/>
+          </a:stretch>
+        </p:blipFill>
+        <p:spPr bwMode="auto">
+          <a:xfrm>
+            <a:off x="9120435" y="1454808"/>
+            <a:ext cx="2302743" cy="2186981"/>
+          </a:xfrm>
+          <a:prstGeom prst="rect">
+            <a:avLst/>
+          </a:prstGeom>
+          <a:noFill/>
+          <a:extLst>
+            <a:ext uri="{909E8E84-426E-40DD-AFC4-6F175D3DCCD1}">
+              <a14:hiddenFill xmlns:a14="http://schemas.microsoft.com/office/drawing/2010/main">
+                <a:solidFill>
+                  <a:srgbClr val="FFFFFF"/>
+                </a:solidFill>
+              </a14:hiddenFill>
+            </a:ext>
+          </a:extLst>
+        </p:spPr>
+      </p:pic>
     </p:spTree>
     <p:extLst>
       <p:ext uri="{BB962C8B-B14F-4D97-AF65-F5344CB8AC3E}">
@@ -10842,6 +12468,47 @@
           </a:p>
         </p:txBody>
       </p:sp>
+      <p:pic>
+        <p:nvPicPr>
+          <p:cNvPr id="4" name="Picture 2" descr="https://s-media-cache-ak0.pinimg.com/736x/58/df/35/58df3549ac4993bc85b985d37e5b3e24.jpg"/>
+          <p:cNvPicPr>
+            <a:picLocks noChangeAspect="1" noChangeArrowheads="1"/>
+          </p:cNvPicPr>
+          <p:nvPr/>
+        </p:nvPicPr>
+        <p:blipFill>
+          <a:blip r:embed="rId6" cstate="print">
+            <a:extLst>
+              <a:ext uri="{28A0092B-C50C-407E-A947-70E740481C1C}">
+                <a14:useLocalDpi xmlns:a14="http://schemas.microsoft.com/office/drawing/2010/main" val="0"/>
+              </a:ext>
+            </a:extLst>
+          </a:blip>
+          <a:srcRect/>
+          <a:stretch>
+            <a:fillRect/>
+          </a:stretch>
+        </p:blipFill>
+        <p:spPr bwMode="auto">
+          <a:xfrm>
+            <a:off x="9403308" y="569867"/>
+            <a:ext cx="1774210" cy="1685018"/>
+          </a:xfrm>
+          <a:prstGeom prst="rect">
+            <a:avLst/>
+          </a:prstGeom>
+          <a:noFill/>
+          <a:extLst>
+            <a:ext uri="{909E8E84-426E-40DD-AFC4-6F175D3DCCD1}">
+              <a14:hiddenFill xmlns:a14="http://schemas.microsoft.com/office/drawing/2010/main">
+                <a:solidFill>
+                  <a:srgbClr val="FFFFFF"/>
+                </a:solidFill>
+              </a14:hiddenFill>
+            </a:ext>
+          </a:extLst>
+        </p:spPr>
+      </p:pic>
     </p:spTree>
     <p:extLst>
       <p:ext uri="{BB962C8B-B14F-4D97-AF65-F5344CB8AC3E}">
@@ -11156,7 +12823,21 @@
                 <a:ea typeface="Times New Roman" pitchFamily="18"/>
                 <a:cs typeface="Times New Roman" pitchFamily="18"/>
               </a:rPr>
-              <a:t>OData implementation using ASP.NET</a:t>
+              <a:t>OData</a:t>
+            </a:r>
+            <a:r>
+              <a:rPr lang="en-US" b="0" i="0" u="none" strike="noStrike" dirty="0" smtClean="0">
+                <a:ln>
+                  <a:noFill/>
+                </a:ln>
+                <a:solidFill>
+                  <a:srgbClr val="4C4C4C"/>
+                </a:solidFill>
+                <a:latin typeface="Georgia" pitchFamily="18"/>
+                <a:ea typeface="Times New Roman" pitchFamily="18"/>
+                <a:cs typeface="Times New Roman" pitchFamily="18"/>
+              </a:rPr>
+              <a:t> Features</a:t>
             </a:r>
           </a:p>
           <a:p>
@@ -11206,14 +12887,15 @@
             </a:endParaRPr>
           </a:p>
           <a:p>
-            <a:pPr marL="0" lvl="0" indent="0" hangingPunct="0">
+            <a:pPr lvl="0" hangingPunct="0">
               <a:lnSpc>
                 <a:spcPct val="93000"/>
               </a:lnSpc>
               <a:spcBef>
                 <a:spcPts val="0"/>
               </a:spcBef>
-              <a:buNone/>
+              <a:buFontTx/>
+              <a:buChar char="-"/>
               <a:tabLst>
                 <a:tab pos="0" algn="l"/>
                 <a:tab pos="457200" algn="l"/>
@@ -11250,6 +12932,100 @@
                 <a:ea typeface="Times New Roman" pitchFamily="18"/>
                 <a:cs typeface="Times New Roman" pitchFamily="18"/>
               </a:rPr>
+              <a:t>OData implementation using ASP.NET WEB API</a:t>
+            </a:r>
+          </a:p>
+          <a:p>
+            <a:pPr lvl="0" hangingPunct="0">
+              <a:lnSpc>
+                <a:spcPct val="93000"/>
+              </a:lnSpc>
+              <a:spcBef>
+                <a:spcPts val="0"/>
+              </a:spcBef>
+              <a:buFontTx/>
+              <a:buChar char="-"/>
+              <a:tabLst>
+                <a:tab pos="0" algn="l"/>
+                <a:tab pos="457200" algn="l"/>
+                <a:tab pos="914400" algn="l"/>
+                <a:tab pos="1371599" algn="l"/>
+                <a:tab pos="1828800" algn="l"/>
+                <a:tab pos="2286000" algn="l"/>
+                <a:tab pos="2743199" algn="l"/>
+                <a:tab pos="3200400" algn="l"/>
+                <a:tab pos="3657600" algn="l"/>
+                <a:tab pos="4114800" algn="l"/>
+                <a:tab pos="4572000" algn="l"/>
+                <a:tab pos="5029200" algn="l"/>
+                <a:tab pos="5486399" algn="l"/>
+                <a:tab pos="5943600" algn="l"/>
+                <a:tab pos="6400799" algn="l"/>
+                <a:tab pos="6858000" algn="l"/>
+                <a:tab pos="7315200" algn="l"/>
+                <a:tab pos="7772400" algn="l"/>
+                <a:tab pos="8229600" algn="l"/>
+                <a:tab pos="8686800" algn="l"/>
+                <a:tab pos="9144000" algn="l"/>
+              </a:tabLst>
+            </a:pPr>
+            <a:endParaRPr lang="en-US" b="0" i="0" u="none" strike="noStrike" baseline="0" dirty="0" smtClean="0">
+              <a:ln>
+                <a:noFill/>
+              </a:ln>
+              <a:solidFill>
+                <a:srgbClr val="4C4C4C"/>
+              </a:solidFill>
+              <a:latin typeface="Georgia" pitchFamily="18"/>
+              <a:ea typeface="Times New Roman" pitchFamily="18"/>
+              <a:cs typeface="Times New Roman" pitchFamily="18"/>
+            </a:endParaRPr>
+          </a:p>
+          <a:p>
+            <a:pPr marL="0" lvl="0" indent="0" hangingPunct="0">
+              <a:lnSpc>
+                <a:spcPct val="93000"/>
+              </a:lnSpc>
+              <a:spcBef>
+                <a:spcPts val="0"/>
+              </a:spcBef>
+              <a:buNone/>
+              <a:tabLst>
+                <a:tab pos="0" algn="l"/>
+                <a:tab pos="457200" algn="l"/>
+                <a:tab pos="914400" algn="l"/>
+                <a:tab pos="1371599" algn="l"/>
+                <a:tab pos="1828800" algn="l"/>
+                <a:tab pos="2286000" algn="l"/>
+                <a:tab pos="2743199" algn="l"/>
+                <a:tab pos="3200400" algn="l"/>
+                <a:tab pos="3657600" algn="l"/>
+                <a:tab pos="4114800" algn="l"/>
+                <a:tab pos="4572000" algn="l"/>
+                <a:tab pos="5029200" algn="l"/>
+                <a:tab pos="5486399" algn="l"/>
+                <a:tab pos="5943600" algn="l"/>
+                <a:tab pos="6400799" algn="l"/>
+                <a:tab pos="6858000" algn="l"/>
+                <a:tab pos="7315200" algn="l"/>
+                <a:tab pos="7772400" algn="l"/>
+                <a:tab pos="8229600" algn="l"/>
+                <a:tab pos="8686800" algn="l"/>
+                <a:tab pos="9144000" algn="l"/>
+              </a:tabLst>
+            </a:pPr>
+            <a:r>
+              <a:rPr lang="en-US" b="0" i="0" u="none" strike="noStrike" baseline="0" dirty="0" smtClean="0">
+                <a:ln>
+                  <a:noFill/>
+                </a:ln>
+                <a:solidFill>
+                  <a:srgbClr val="4C4C4C"/>
+                </a:solidFill>
+                <a:latin typeface="Georgia" pitchFamily="18"/>
+                <a:ea typeface="Times New Roman" pitchFamily="18"/>
+                <a:cs typeface="Times New Roman" pitchFamily="18"/>
+              </a:rPr>
               <a:t>- OData query operators and methods</a:t>
             </a:r>
           </a:p>
@@ -11258,6 +13034,47 @@
           </a:p>
         </p:txBody>
       </p:sp>
+      <p:pic>
+        <p:nvPicPr>
+          <p:cNvPr id="4" name="Picture 2" descr="https://s-media-cache-ak0.pinimg.com/736x/58/df/35/58df3549ac4993bc85b985d37e5b3e24.jpg"/>
+          <p:cNvPicPr>
+            <a:picLocks noChangeAspect="1" noChangeArrowheads="1"/>
+          </p:cNvPicPr>
+          <p:nvPr/>
+        </p:nvPicPr>
+        <p:blipFill>
+          <a:blip r:embed="rId2" cstate="print">
+            <a:extLst>
+              <a:ext uri="{28A0092B-C50C-407E-A947-70E740481C1C}">
+                <a14:useLocalDpi xmlns:a14="http://schemas.microsoft.com/office/drawing/2010/main" val="0"/>
+              </a:ext>
+            </a:extLst>
+          </a:blip>
+          <a:srcRect/>
+          <a:stretch>
+            <a:fillRect/>
+          </a:stretch>
+        </p:blipFill>
+        <p:spPr bwMode="auto">
+          <a:xfrm>
+            <a:off x="8789158" y="365124"/>
+            <a:ext cx="2661315" cy="2527527"/>
+          </a:xfrm>
+          <a:prstGeom prst="rect">
+            <a:avLst/>
+          </a:prstGeom>
+          <a:noFill/>
+          <a:extLst>
+            <a:ext uri="{909E8E84-426E-40DD-AFC4-6F175D3DCCD1}">
+              <a14:hiddenFill xmlns:a14="http://schemas.microsoft.com/office/drawing/2010/main">
+                <a:solidFill>
+                  <a:srgbClr val="FFFFFF"/>
+                </a:solidFill>
+              </a14:hiddenFill>
+            </a:ext>
+          </a:extLst>
+        </p:spPr>
+      </p:pic>
     </p:spTree>
     <p:extLst>
       <p:ext uri="{BB962C8B-B14F-4D97-AF65-F5344CB8AC3E}">
@@ -11551,33 +13368,8 @@
                 <a:ea typeface="Times New Roman" pitchFamily="18"/>
                 <a:cs typeface="Times New Roman" pitchFamily="18"/>
               </a:rPr>
-              <a:t> access </a:t>
-            </a:r>
-            <a:r>
-              <a:rPr lang="en-US" b="0" i="0" u="none" strike="noStrike" baseline="0" dirty="0" smtClean="0">
-                <a:ln>
-                  <a:noFill/>
-                </a:ln>
-                <a:solidFill>
-                  <a:srgbClr val="000000"/>
-                </a:solidFill>
-                <a:latin typeface="Georgia" pitchFamily="18"/>
-                <a:ea typeface="Times New Roman" pitchFamily="18"/>
-                <a:cs typeface="Times New Roman" pitchFamily="18"/>
-              </a:rPr>
-              <a:t>protocol</a:t>
-            </a:r>
-            <a:endParaRPr lang="en-US" b="0" i="0" u="none" strike="noStrike" baseline="0" dirty="0" smtClean="0">
-              <a:ln>
-                <a:noFill/>
-              </a:ln>
-              <a:solidFill>
-                <a:srgbClr val="000000"/>
-              </a:solidFill>
-              <a:latin typeface="Georgia" pitchFamily="18"/>
-              <a:ea typeface="Times New Roman" pitchFamily="18"/>
-              <a:cs typeface="Times New Roman" pitchFamily="18"/>
-            </a:endParaRPr>
+              <a:t> access protocol</a:t>
+            </a:r>
           </a:p>
           <a:p>
             <a:pPr marL="0" lvl="0" indent="0" hangingPunct="0">
@@ -11784,7 +13576,21 @@
                 <a:ea typeface="Times New Roman" pitchFamily="18"/>
                 <a:cs typeface="Times New Roman" pitchFamily="18"/>
               </a:rPr>
-              <a:t>- It is </a:t>
+              <a:t>- It is follows many principles</a:t>
+            </a:r>
+            <a:r>
+              <a:rPr lang="en-US" b="0" i="0" u="none" strike="noStrike" dirty="0" smtClean="0">
+                <a:ln>
+                  <a:noFill/>
+                </a:ln>
+                <a:solidFill>
+                  <a:srgbClr val="000000"/>
+                </a:solidFill>
+                <a:latin typeface="Georgia" pitchFamily="18"/>
+                <a:ea typeface="Times New Roman" pitchFamily="18"/>
+                <a:cs typeface="Times New Roman" pitchFamily="18"/>
+              </a:rPr>
+              <a:t> of REST </a:t>
             </a:r>
             <a:r>
               <a:rPr lang="en-US" b="0" i="0" u="none" strike="noStrike" baseline="0" dirty="0" smtClean="0">
@@ -11798,75 +13604,8 @@
                 <a:ea typeface="Times New Roman" pitchFamily="18"/>
                 <a:cs typeface="Times New Roman" pitchFamily="18"/>
               </a:rPr>
-              <a:t>follows many principles</a:t>
-            </a:r>
-            <a:r>
-              <a:rPr lang="en-US" b="0" i="0" u="none" strike="noStrike" dirty="0" smtClean="0">
-                <a:ln>
-                  <a:noFill/>
-                </a:ln>
-                <a:solidFill>
-                  <a:srgbClr val="000000"/>
-                </a:solidFill>
-                <a:latin typeface="Georgia" pitchFamily="18"/>
-                <a:ea typeface="Times New Roman" pitchFamily="18"/>
-                <a:cs typeface="Times New Roman" pitchFamily="18"/>
-              </a:rPr>
-              <a:t> of REST </a:t>
-            </a:r>
-            <a:r>
-              <a:rPr lang="en-US" b="0" i="0" u="none" strike="noStrike" baseline="0" dirty="0" smtClean="0">
-                <a:ln>
-                  <a:noFill/>
-                </a:ln>
-                <a:solidFill>
-                  <a:srgbClr val="000000"/>
-                </a:solidFill>
-                <a:latin typeface="Georgia" pitchFamily="18"/>
-                <a:ea typeface="Times New Roman" pitchFamily="18"/>
-                <a:cs typeface="Times New Roman" pitchFamily="18"/>
-              </a:rPr>
-              <a:t>and </a:t>
-            </a:r>
-            <a:r>
-              <a:rPr lang="en-US" b="0" i="0" u="none" strike="noStrike" baseline="0" dirty="0" smtClean="0">
-                <a:ln>
-                  <a:noFill/>
-                </a:ln>
-                <a:solidFill>
-                  <a:srgbClr val="000000"/>
-                </a:solidFill>
-                <a:latin typeface="Georgia" pitchFamily="18"/>
-                <a:ea typeface="Times New Roman" pitchFamily="18"/>
-                <a:cs typeface="Times New Roman" pitchFamily="18"/>
-              </a:rPr>
-              <a:t>supports most of the HTTP verbs(GET, POST, PUT, DELETE, </a:t>
-            </a:r>
-            <a:r>
-              <a:rPr lang="en-US" b="0" i="0" u="none" strike="noStrike" baseline="0" dirty="0" smtClean="0">
-                <a:ln>
-                  <a:noFill/>
-                </a:ln>
-                <a:solidFill>
-                  <a:srgbClr val="000000"/>
-                </a:solidFill>
-                <a:latin typeface="Georgia" pitchFamily="18"/>
-                <a:ea typeface="Times New Roman" pitchFamily="18"/>
-                <a:cs typeface="Times New Roman" pitchFamily="18"/>
-              </a:rPr>
-              <a:t>PATCH, MERGE)</a:t>
-            </a:r>
-            <a:endParaRPr lang="en-US" b="0" i="0" u="none" strike="noStrike" baseline="0" dirty="0" smtClean="0">
-              <a:ln>
-                <a:noFill/>
-              </a:ln>
-              <a:solidFill>
-                <a:srgbClr val="000000"/>
-              </a:solidFill>
-              <a:latin typeface="Georgia" pitchFamily="18"/>
-              <a:ea typeface="Times New Roman" pitchFamily="18"/>
-              <a:cs typeface="Times New Roman" pitchFamily="18"/>
-            </a:endParaRPr>
+              <a:t>and supports most of the HTTP verbs(GET, POST, PUT, DELETE, PATCH, MERGE)</a:t>
+            </a:r>
           </a:p>
           <a:p>
             <a:pPr marL="0" lvl="0" indent="0" hangingPunct="0">
@@ -11958,7 +13697,21 @@
                 <a:ea typeface="Times New Roman" pitchFamily="18"/>
                 <a:cs typeface="Times New Roman" pitchFamily="18"/>
               </a:rPr>
-              <a:t>- It supports </a:t>
+              <a:t>- It supports different types of data formatting: </a:t>
+            </a:r>
+            <a:r>
+              <a:rPr lang="en-US" b="0" i="0" u="none" strike="noStrike" baseline="0" dirty="0" err="1" smtClean="0">
+                <a:ln>
+                  <a:noFill/>
+                </a:ln>
+                <a:solidFill>
+                  <a:srgbClr val="000000"/>
+                </a:solidFill>
+                <a:latin typeface="Georgia" pitchFamily="18"/>
+                <a:ea typeface="Times New Roman" pitchFamily="18"/>
+                <a:cs typeface="Times New Roman" pitchFamily="18"/>
+              </a:rPr>
+              <a:t>ATOMPub</a:t>
             </a:r>
             <a:r>
               <a:rPr lang="en-US" b="0" i="0" u="none" strike="noStrike" baseline="0" dirty="0" smtClean="0">
@@ -11972,81 +13725,55 @@
                 <a:ea typeface="Times New Roman" pitchFamily="18"/>
                 <a:cs typeface="Times New Roman" pitchFamily="18"/>
               </a:rPr>
-              <a:t>different </a:t>
-            </a:r>
-            <a:r>
-              <a:rPr lang="en-US" b="0" i="0" u="none" strike="noStrike" baseline="0" dirty="0" smtClean="0">
-                <a:ln>
-                  <a:noFill/>
-                </a:ln>
-                <a:solidFill>
-                  <a:srgbClr val="000000"/>
-                </a:solidFill>
-                <a:latin typeface="Georgia" pitchFamily="18"/>
-                <a:ea typeface="Times New Roman" pitchFamily="18"/>
-                <a:cs typeface="Times New Roman" pitchFamily="18"/>
-              </a:rPr>
-              <a:t>types of data formatting: </a:t>
-            </a:r>
-            <a:r>
-              <a:rPr lang="en-US" b="0" i="0" u="none" strike="noStrike" baseline="0" dirty="0" err="1" smtClean="0">
-                <a:ln>
-                  <a:noFill/>
-                </a:ln>
-                <a:solidFill>
-                  <a:srgbClr val="000000"/>
-                </a:solidFill>
-                <a:latin typeface="Georgia" pitchFamily="18"/>
-                <a:ea typeface="Times New Roman" pitchFamily="18"/>
-                <a:cs typeface="Times New Roman" pitchFamily="18"/>
-              </a:rPr>
-              <a:t>ATOMPub</a:t>
-            </a:r>
-            <a:r>
-              <a:rPr lang="en-US" b="0" i="0" u="none" strike="noStrike" baseline="0" dirty="0" smtClean="0">
-                <a:ln>
-                  <a:noFill/>
-                </a:ln>
-                <a:solidFill>
-                  <a:srgbClr val="000000"/>
-                </a:solidFill>
-                <a:latin typeface="Georgia" pitchFamily="18"/>
-                <a:ea typeface="Times New Roman" pitchFamily="18"/>
-                <a:cs typeface="Times New Roman" pitchFamily="18"/>
-              </a:rPr>
-              <a:t>(XML), </a:t>
-            </a:r>
-            <a:r>
-              <a:rPr lang="en-US" b="0" i="0" u="none" strike="noStrike" baseline="0" dirty="0" smtClean="0">
-                <a:ln>
-                  <a:noFill/>
-                </a:ln>
-                <a:solidFill>
-                  <a:srgbClr val="000000"/>
-                </a:solidFill>
-                <a:latin typeface="Georgia" pitchFamily="18"/>
-                <a:ea typeface="Times New Roman" pitchFamily="18"/>
-                <a:cs typeface="Times New Roman" pitchFamily="18"/>
-              </a:rPr>
-              <a:t>JSON</a:t>
-            </a:r>
-            <a:endParaRPr lang="en-US" b="0" i="0" u="none" strike="noStrike" baseline="0" dirty="0" smtClean="0">
-              <a:ln>
-                <a:noFill/>
-              </a:ln>
-              <a:solidFill>
-                <a:srgbClr val="000000"/>
-              </a:solidFill>
-              <a:latin typeface="Georgia" pitchFamily="18"/>
-              <a:ea typeface="Times New Roman" pitchFamily="18"/>
-              <a:cs typeface="Times New Roman" pitchFamily="18"/>
-            </a:endParaRPr>
+              <a:t>(XML), JSON</a:t>
+            </a:r>
           </a:p>
           <a:p>
             <a:endParaRPr lang="en-US" dirty="0"/>
           </a:p>
         </p:txBody>
       </p:sp>
+      <p:pic>
+        <p:nvPicPr>
+          <p:cNvPr id="4" name="Picture 2" descr="https://s-media-cache-ak0.pinimg.com/736x/58/df/35/58df3549ac4993bc85b985d37e5b3e24.jpg"/>
+          <p:cNvPicPr>
+            <a:picLocks noChangeAspect="1" noChangeArrowheads="1"/>
+          </p:cNvPicPr>
+          <p:nvPr/>
+        </p:nvPicPr>
+        <p:blipFill>
+          <a:blip r:embed="rId2" cstate="print">
+            <a:extLst>
+              <a:ext uri="{28A0092B-C50C-407E-A947-70E740481C1C}">
+                <a14:useLocalDpi xmlns:a14="http://schemas.microsoft.com/office/drawing/2010/main" val="0"/>
+              </a:ext>
+            </a:extLst>
+          </a:blip>
+          <a:srcRect/>
+          <a:stretch>
+            <a:fillRect/>
+          </a:stretch>
+        </p:blipFill>
+        <p:spPr bwMode="auto">
+          <a:xfrm>
+            <a:off x="9212239" y="365125"/>
+            <a:ext cx="2141561" cy="2033902"/>
+          </a:xfrm>
+          <a:prstGeom prst="rect">
+            <a:avLst/>
+          </a:prstGeom>
+          <a:noFill/>
+          <a:extLst>
+            <a:ext uri="{909E8E84-426E-40DD-AFC4-6F175D3DCCD1}">
+              <a14:hiddenFill xmlns:a14="http://schemas.microsoft.com/office/drawing/2010/main">
+                <a:solidFill>
+                  <a:srgbClr val="FFFFFF"/>
+                </a:solidFill>
+              </a14:hiddenFill>
+            </a:ext>
+          </a:extLst>
+        </p:spPr>
+      </p:pic>
     </p:spTree>
     <p:extLst>
       <p:ext uri="{BB962C8B-B14F-4D97-AF65-F5344CB8AC3E}">
@@ -12288,17 +14015,6 @@
               </a:rPr>
               <a:t>rotocol</a:t>
             </a:r>
-            <a:endParaRPr lang="en-US" b="0" i="0" u="none" strike="noStrike" baseline="0" dirty="0" smtClean="0">
-              <a:ln>
-                <a:noFill/>
-              </a:ln>
-              <a:solidFill>
-                <a:srgbClr val="000000"/>
-              </a:solidFill>
-              <a:latin typeface="Georgia" pitchFamily="18"/>
-              <a:ea typeface="Times New Roman" pitchFamily="18"/>
-              <a:cs typeface="Times New Roman" pitchFamily="18"/>
-            </a:endParaRPr>
           </a:p>
           <a:p>
             <a:pPr marL="0" lvl="0" indent="0" hangingPunct="0">
@@ -12390,33 +14106,8 @@
                 <a:ea typeface="Times New Roman" pitchFamily="18"/>
                 <a:cs typeface="Times New Roman" pitchFamily="18"/>
               </a:rPr>
-              <a:t>- It is mainly operation(Verb) focused and supports HTTP POST </a:t>
-            </a:r>
-            <a:r>
-              <a:rPr lang="en-US" b="0" i="0" u="none" strike="noStrike" baseline="0" dirty="0" smtClean="0">
-                <a:ln>
-                  <a:noFill/>
-                </a:ln>
-                <a:solidFill>
-                  <a:srgbClr val="000000"/>
-                </a:solidFill>
-                <a:latin typeface="Georgia" pitchFamily="18"/>
-                <a:ea typeface="Times New Roman" pitchFamily="18"/>
-                <a:cs typeface="Times New Roman" pitchFamily="18"/>
-              </a:rPr>
-              <a:t>only</a:t>
-            </a:r>
-            <a:endParaRPr lang="en-US" b="0" i="0" u="none" strike="noStrike" baseline="0" dirty="0" smtClean="0">
-              <a:ln>
-                <a:noFill/>
-              </a:ln>
-              <a:solidFill>
-                <a:srgbClr val="000000"/>
-              </a:solidFill>
-              <a:latin typeface="Georgia" pitchFamily="18"/>
-              <a:ea typeface="Times New Roman" pitchFamily="18"/>
-              <a:cs typeface="Times New Roman" pitchFamily="18"/>
-            </a:endParaRPr>
+              <a:t>- It is mainly operation(Verb) focused and supports HTTP POST only</a:t>
+            </a:r>
           </a:p>
           <a:p>
             <a:pPr marL="0" lvl="0" indent="0" hangingPunct="0">
@@ -12508,33 +14199,8 @@
                 <a:ea typeface="Times New Roman" pitchFamily="18"/>
                 <a:cs typeface="Times New Roman" pitchFamily="18"/>
               </a:rPr>
-              <a:t>- It is based on XML and contains lots of meta-data. So it is little </a:t>
-            </a:r>
-            <a:r>
-              <a:rPr lang="en-US" b="0" i="0" u="none" strike="noStrike" baseline="0" dirty="0" smtClean="0">
-                <a:ln>
-                  <a:noFill/>
-                </a:ln>
-                <a:solidFill>
-                  <a:srgbClr val="000000"/>
-                </a:solidFill>
-                <a:latin typeface="Georgia" pitchFamily="18"/>
-                <a:ea typeface="Times New Roman" pitchFamily="18"/>
-                <a:cs typeface="Times New Roman" pitchFamily="18"/>
-              </a:rPr>
-              <a:t>slower</a:t>
-            </a:r>
-            <a:endParaRPr lang="en-US" b="0" i="0" u="none" strike="noStrike" baseline="0" dirty="0" smtClean="0">
-              <a:ln>
-                <a:noFill/>
-              </a:ln>
-              <a:solidFill>
-                <a:srgbClr val="000000"/>
-              </a:solidFill>
-              <a:latin typeface="Georgia" pitchFamily="18"/>
-              <a:ea typeface="Times New Roman" pitchFamily="18"/>
-              <a:cs typeface="Times New Roman" pitchFamily="18"/>
-            </a:endParaRPr>
+              <a:t>- It is based on XML and contains lots of meta-data. So it is little slower</a:t>
+            </a:r>
           </a:p>
           <a:p>
             <a:pPr marL="0" lvl="0" indent="0" hangingPunct="0">
@@ -13118,6 +14784,47 @@
           </a:p>
         </p:txBody>
       </p:sp>
+      <p:pic>
+        <p:nvPicPr>
+          <p:cNvPr id="4" name="Picture 2" descr="https://s-media-cache-ak0.pinimg.com/736x/58/df/35/58df3549ac4993bc85b985d37e5b3e24.jpg"/>
+          <p:cNvPicPr>
+            <a:picLocks noChangeAspect="1" noChangeArrowheads="1"/>
+          </p:cNvPicPr>
+          <p:nvPr/>
+        </p:nvPicPr>
+        <p:blipFill>
+          <a:blip r:embed="rId2" cstate="print">
+            <a:extLst>
+              <a:ext uri="{28A0092B-C50C-407E-A947-70E740481C1C}">
+                <a14:useLocalDpi xmlns:a14="http://schemas.microsoft.com/office/drawing/2010/main" val="0"/>
+              </a:ext>
+            </a:extLst>
+          </a:blip>
+          <a:srcRect/>
+          <a:stretch>
+            <a:fillRect/>
+          </a:stretch>
+        </p:blipFill>
+        <p:spPr bwMode="auto">
+          <a:xfrm>
+            <a:off x="9579590" y="365125"/>
+            <a:ext cx="1774210" cy="1685018"/>
+          </a:xfrm>
+          <a:prstGeom prst="rect">
+            <a:avLst/>
+          </a:prstGeom>
+          <a:noFill/>
+          <a:extLst>
+            <a:ext uri="{909E8E84-426E-40DD-AFC4-6F175D3DCCD1}">
+              <a14:hiddenFill xmlns:a14="http://schemas.microsoft.com/office/drawing/2010/main">
+                <a:solidFill>
+                  <a:srgbClr val="FFFFFF"/>
+                </a:solidFill>
+              </a14:hiddenFill>
+            </a:ext>
+          </a:extLst>
+        </p:spPr>
+      </p:pic>
     </p:spTree>
     <p:extLst>
       <p:ext uri="{BB962C8B-B14F-4D97-AF65-F5344CB8AC3E}">
@@ -13628,6 +15335,47 @@
           </a:p>
         </p:txBody>
       </p:sp>
+      <p:pic>
+        <p:nvPicPr>
+          <p:cNvPr id="4" name="Picture 2" descr="https://s-media-cache-ak0.pinimg.com/736x/58/df/35/58df3549ac4993bc85b985d37e5b3e24.jpg"/>
+          <p:cNvPicPr>
+            <a:picLocks noChangeAspect="1" noChangeArrowheads="1"/>
+          </p:cNvPicPr>
+          <p:nvPr/>
+        </p:nvPicPr>
+        <p:blipFill>
+          <a:blip r:embed="rId3" cstate="print">
+            <a:extLst>
+              <a:ext uri="{28A0092B-C50C-407E-A947-70E740481C1C}">
+                <a14:useLocalDpi xmlns:a14="http://schemas.microsoft.com/office/drawing/2010/main" val="0"/>
+              </a:ext>
+            </a:extLst>
+          </a:blip>
+          <a:srcRect/>
+          <a:stretch>
+            <a:fillRect/>
+          </a:stretch>
+        </p:blipFill>
+        <p:spPr bwMode="auto">
+          <a:xfrm>
+            <a:off x="9894627" y="365125"/>
+            <a:ext cx="1774210" cy="1685018"/>
+          </a:xfrm>
+          <a:prstGeom prst="rect">
+            <a:avLst/>
+          </a:prstGeom>
+          <a:noFill/>
+          <a:extLst>
+            <a:ext uri="{909E8E84-426E-40DD-AFC4-6F175D3DCCD1}">
+              <a14:hiddenFill xmlns:a14="http://schemas.microsoft.com/office/drawing/2010/main">
+                <a:solidFill>
+                  <a:srgbClr val="FFFFFF"/>
+                </a:solidFill>
+              </a14:hiddenFill>
+            </a:ext>
+          </a:extLst>
+        </p:spPr>
+      </p:pic>
     </p:spTree>
     <p:extLst>
       <p:ext uri="{BB962C8B-B14F-4D97-AF65-F5344CB8AC3E}">
@@ -13808,7 +15556,35 @@
                 <a:ea typeface="Times New Roman" pitchFamily="18"/>
                 <a:cs typeface="Times New Roman" pitchFamily="18"/>
               </a:rPr>
-              <a:t>- It </a:t>
+              <a:t>- It stands for </a:t>
+            </a:r>
+            <a:r>
+              <a:rPr lang="en-US" b="0" i="0" u="none" strike="noStrike" baseline="0" dirty="0" err="1" smtClean="0">
+                <a:ln>
+                  <a:noFill/>
+                </a:ln>
+                <a:solidFill>
+                  <a:srgbClr val="0070C0"/>
+                </a:solidFill>
+                <a:latin typeface="Georgia" pitchFamily="18"/>
+                <a:ea typeface="Times New Roman" pitchFamily="18"/>
+                <a:cs typeface="Times New Roman" pitchFamily="18"/>
+              </a:rPr>
+              <a:t>RE</a:t>
+            </a:r>
+            <a:r>
+              <a:rPr lang="en-US" b="0" i="0" u="none" strike="noStrike" baseline="0" dirty="0" err="1" smtClean="0">
+                <a:ln>
+                  <a:noFill/>
+                </a:ln>
+                <a:solidFill>
+                  <a:srgbClr val="000000"/>
+                </a:solidFill>
+                <a:latin typeface="Georgia" pitchFamily="18"/>
+                <a:ea typeface="Times New Roman" pitchFamily="18"/>
+                <a:cs typeface="Times New Roman" pitchFamily="18"/>
+              </a:rPr>
+              <a:t>presentational</a:t>
             </a:r>
             <a:r>
               <a:rPr lang="en-US" b="0" i="0" u="none" strike="noStrike" baseline="0" dirty="0" smtClean="0">
@@ -13822,10 +15598,10 @@
                 <a:ea typeface="Times New Roman" pitchFamily="18"/>
                 <a:cs typeface="Times New Roman" pitchFamily="18"/>
               </a:rPr>
-              <a:t>stands for </a:t>
-            </a:r>
-            <a:r>
-              <a:rPr lang="en-US" b="0" i="0" u="none" strike="noStrike" baseline="0" dirty="0" err="1" smtClean="0">
+              <a:t> </a:t>
+            </a:r>
+            <a:r>
+              <a:rPr lang="en-US" b="0" i="0" u="none" strike="noStrike" baseline="0" dirty="0" smtClean="0">
                 <a:ln>
                   <a:noFill/>
                 </a:ln>
@@ -13836,10 +15612,10 @@
                 <a:ea typeface="Times New Roman" pitchFamily="18"/>
                 <a:cs typeface="Times New Roman" pitchFamily="18"/>
               </a:rPr>
-              <a:t>RE</a:t>
-            </a:r>
-            <a:r>
-              <a:rPr lang="en-US" b="0" i="0" u="none" strike="noStrike" baseline="0" dirty="0" err="1" smtClean="0">
+              <a:t>S</a:t>
+            </a:r>
+            <a:r>
+              <a:rPr lang="en-US" b="0" i="0" u="none" strike="noStrike" baseline="0" dirty="0" smtClean="0">
                 <a:ln>
                   <a:noFill/>
                 </a:ln>
@@ -13850,7 +15626,7 @@
                 <a:ea typeface="Times New Roman" pitchFamily="18"/>
                 <a:cs typeface="Times New Roman" pitchFamily="18"/>
               </a:rPr>
-              <a:t>presentational</a:t>
+              <a:t>tate </a:t>
             </a:r>
             <a:r>
               <a:rPr lang="en-US" b="0" i="0" u="none" strike="noStrike" baseline="0" dirty="0" smtClean="0">
@@ -13858,13 +15634,13 @@
                   <a:noFill/>
                 </a:ln>
                 <a:solidFill>
-                  <a:srgbClr val="000000"/>
+                  <a:srgbClr val="0070C0"/>
                 </a:solidFill>
                 <a:latin typeface="Georgia" pitchFamily="18"/>
                 <a:ea typeface="Times New Roman" pitchFamily="18"/>
                 <a:cs typeface="Times New Roman" pitchFamily="18"/>
               </a:rPr>
-              <a:t> </a:t>
+              <a:t>T</a:t>
             </a:r>
             <a:r>
               <a:rPr lang="en-US" b="0" i="0" u="none" strike="noStrike" baseline="0" dirty="0" smtClean="0">
@@ -13872,67 +15648,14 @@
                   <a:noFill/>
                 </a:ln>
                 <a:solidFill>
-                  <a:srgbClr val="0070C0"/>
+                  <a:srgbClr val="000000"/>
                 </a:solidFill>
                 <a:latin typeface="Georgia" pitchFamily="18"/>
                 <a:ea typeface="Times New Roman" pitchFamily="18"/>
                 <a:cs typeface="Times New Roman" pitchFamily="18"/>
               </a:rPr>
-              <a:t>S</a:t>
-            </a:r>
-            <a:r>
-              <a:rPr lang="en-US" b="0" i="0" u="none" strike="noStrike" baseline="0" dirty="0" smtClean="0">
-                <a:ln>
-                  <a:noFill/>
-                </a:ln>
-                <a:solidFill>
-                  <a:srgbClr val="000000"/>
-                </a:solidFill>
-                <a:latin typeface="Georgia" pitchFamily="18"/>
-                <a:ea typeface="Times New Roman" pitchFamily="18"/>
-                <a:cs typeface="Times New Roman" pitchFamily="18"/>
-              </a:rPr>
-              <a:t>tate </a:t>
-            </a:r>
-            <a:r>
-              <a:rPr lang="en-US" b="0" i="0" u="none" strike="noStrike" baseline="0" dirty="0" smtClean="0">
-                <a:ln>
-                  <a:noFill/>
-                </a:ln>
-                <a:solidFill>
-                  <a:srgbClr val="0070C0"/>
-                </a:solidFill>
-                <a:latin typeface="Georgia" pitchFamily="18"/>
-                <a:ea typeface="Times New Roman" pitchFamily="18"/>
-                <a:cs typeface="Times New Roman" pitchFamily="18"/>
-              </a:rPr>
-              <a:t>T</a:t>
-            </a:r>
-            <a:r>
-              <a:rPr lang="en-US" b="0" i="0" u="none" strike="noStrike" baseline="0" dirty="0" smtClean="0">
-                <a:ln>
-                  <a:noFill/>
-                </a:ln>
-                <a:solidFill>
-                  <a:srgbClr val="000000"/>
-                </a:solidFill>
-                <a:latin typeface="Georgia" pitchFamily="18"/>
-                <a:ea typeface="Times New Roman" pitchFamily="18"/>
-                <a:cs typeface="Times New Roman" pitchFamily="18"/>
-              </a:rPr>
               <a:t>ransfer</a:t>
             </a:r>
-            <a:endParaRPr lang="en-US" b="0" i="0" u="none" strike="noStrike" baseline="0" dirty="0" smtClean="0">
-              <a:ln>
-                <a:noFill/>
-              </a:ln>
-              <a:solidFill>
-                <a:srgbClr val="000000"/>
-              </a:solidFill>
-              <a:latin typeface="Georgia" pitchFamily="18"/>
-              <a:ea typeface="Times New Roman" pitchFamily="18"/>
-              <a:cs typeface="Times New Roman" pitchFamily="18"/>
-            </a:endParaRPr>
           </a:p>
           <a:p>
             <a:pPr marL="0" lvl="0" indent="0" hangingPunct="0">
@@ -14024,47 +15747,8 @@
                 <a:ea typeface="Times New Roman" pitchFamily="18"/>
                 <a:cs typeface="Times New Roman" pitchFamily="18"/>
               </a:rPr>
-              <a:t>- </a:t>
-            </a:r>
-            <a:r>
-              <a:rPr lang="en-US" b="0" i="0" u="none" strike="noStrike" baseline="0" dirty="0" smtClean="0">
-                <a:ln>
-                  <a:noFill/>
-                </a:ln>
-                <a:solidFill>
-                  <a:srgbClr val="000000"/>
-                </a:solidFill>
-                <a:latin typeface="Georgia" pitchFamily="18"/>
-                <a:ea typeface="Times New Roman" pitchFamily="18"/>
-                <a:cs typeface="Times New Roman" pitchFamily="18"/>
-              </a:rPr>
-              <a:t>REST is an architectural style not an protocol unlike SOAP and </a:t>
-            </a:r>
-            <a:r>
-              <a:rPr lang="en-US" b="0" i="0" u="none" strike="noStrike" baseline="0" dirty="0" smtClean="0">
-                <a:ln>
-                  <a:noFill/>
-                </a:ln>
-                <a:solidFill>
-                  <a:srgbClr val="000000"/>
-                </a:solidFill>
-                <a:latin typeface="Georgia" pitchFamily="18"/>
-                <a:ea typeface="Times New Roman" pitchFamily="18"/>
-                <a:cs typeface="Times New Roman" pitchFamily="18"/>
-              </a:rPr>
-              <a:t>HTTP</a:t>
-            </a:r>
-            <a:endParaRPr lang="en-US" b="0" i="0" u="none" strike="noStrike" baseline="0" dirty="0" smtClean="0">
-              <a:ln>
-                <a:noFill/>
-              </a:ln>
-              <a:solidFill>
-                <a:srgbClr val="000000"/>
-              </a:solidFill>
-              <a:latin typeface="Georgia" pitchFamily="18"/>
-              <a:ea typeface="Times New Roman" pitchFamily="18"/>
-              <a:cs typeface="Times New Roman" pitchFamily="18"/>
-            </a:endParaRPr>
+              <a:t>- REST is an architectural style not an protocol unlike SOAP and HTTP</a:t>
+            </a:r>
           </a:p>
           <a:p>
             <a:pPr marL="0" lvl="0" indent="0" hangingPunct="0">
@@ -14156,33 +15840,8 @@
                 <a:ea typeface="Times New Roman" pitchFamily="18"/>
                 <a:cs typeface="Times New Roman" pitchFamily="18"/>
               </a:rPr>
-              <a:t>- It fully supports HTTP and it is less coupled to the </a:t>
-            </a:r>
-            <a:r>
-              <a:rPr lang="en-US" b="0" i="0" u="none" strike="noStrike" baseline="0" dirty="0" smtClean="0">
-                <a:ln>
-                  <a:noFill/>
-                </a:ln>
-                <a:solidFill>
-                  <a:srgbClr val="000000"/>
-                </a:solidFill>
-                <a:latin typeface="Georgia" pitchFamily="18"/>
-                <a:ea typeface="Times New Roman" pitchFamily="18"/>
-                <a:cs typeface="Times New Roman" pitchFamily="18"/>
-              </a:rPr>
-              <a:t>server</a:t>
-            </a:r>
-            <a:endParaRPr lang="en-US" b="0" i="0" u="none" strike="noStrike" baseline="0" dirty="0" smtClean="0">
-              <a:ln>
-                <a:noFill/>
-              </a:ln>
-              <a:solidFill>
-                <a:srgbClr val="000000"/>
-              </a:solidFill>
-              <a:latin typeface="Georgia" pitchFamily="18"/>
-              <a:ea typeface="Times New Roman" pitchFamily="18"/>
-              <a:cs typeface="Times New Roman" pitchFamily="18"/>
-            </a:endParaRPr>
+              <a:t>- It fully supports HTTP and it is less coupled to the server</a:t>
+            </a:r>
           </a:p>
           <a:p>
             <a:pPr marL="0" lvl="0" indent="0" hangingPunct="0">
@@ -14234,6 +15893,47 @@
           </a:p>
         </p:txBody>
       </p:sp>
+      <p:pic>
+        <p:nvPicPr>
+          <p:cNvPr id="4" name="Picture 2" descr="https://s-media-cache-ak0.pinimg.com/736x/58/df/35/58df3549ac4993bc85b985d37e5b3e24.jpg"/>
+          <p:cNvPicPr>
+            <a:picLocks noChangeAspect="1" noChangeArrowheads="1"/>
+          </p:cNvPicPr>
+          <p:nvPr/>
+        </p:nvPicPr>
+        <p:blipFill>
+          <a:blip r:embed="rId3" cstate="print">
+            <a:extLst>
+              <a:ext uri="{28A0092B-C50C-407E-A947-70E740481C1C}">
+                <a14:useLocalDpi xmlns:a14="http://schemas.microsoft.com/office/drawing/2010/main" val="0"/>
+              </a:ext>
+            </a:extLst>
+          </a:blip>
+          <a:srcRect/>
+          <a:stretch>
+            <a:fillRect/>
+          </a:stretch>
+        </p:blipFill>
+        <p:spPr bwMode="auto">
+          <a:xfrm>
+            <a:off x="9744502" y="365126"/>
+            <a:ext cx="1774210" cy="1685018"/>
+          </a:xfrm>
+          <a:prstGeom prst="rect">
+            <a:avLst/>
+          </a:prstGeom>
+          <a:noFill/>
+          <a:extLst>
+            <a:ext uri="{909E8E84-426E-40DD-AFC4-6F175D3DCCD1}">
+              <a14:hiddenFill xmlns:a14="http://schemas.microsoft.com/office/drawing/2010/main">
+                <a:solidFill>
+                  <a:srgbClr val="FFFFFF"/>
+                </a:solidFill>
+              </a14:hiddenFill>
+            </a:ext>
+          </a:extLst>
+        </p:spPr>
+      </p:pic>
     </p:spTree>
     <p:extLst>
       <p:ext uri="{BB962C8B-B14F-4D97-AF65-F5344CB8AC3E}">
@@ -14374,63 +16074,7 @@
                 <a:ea typeface="Times New Roman" pitchFamily="18"/>
                 <a:cs typeface="Times New Roman" pitchFamily="18"/>
               </a:rPr>
-              <a:t>- It is based </a:t>
-            </a:r>
-            <a:r>
-              <a:rPr lang="en-US" b="0" i="0" u="none" strike="noStrike" baseline="0" dirty="0" smtClean="0">
-                <a:ln>
-                  <a:noFill/>
-                </a:ln>
-                <a:solidFill>
-                  <a:srgbClr val="000000"/>
-                </a:solidFill>
-                <a:latin typeface="Georgia" pitchFamily="18"/>
-                <a:ea typeface="Times New Roman" pitchFamily="18"/>
-                <a:cs typeface="Times New Roman" pitchFamily="18"/>
-              </a:rPr>
-              <a:t>on REST </a:t>
-            </a:r>
-            <a:r>
-              <a:rPr lang="en-US" b="0" i="0" u="none" strike="noStrike" baseline="0" dirty="0" smtClean="0">
-                <a:ln>
-                  <a:noFill/>
-                </a:ln>
-                <a:solidFill>
-                  <a:srgbClr val="000000"/>
-                </a:solidFill>
-                <a:latin typeface="Georgia" pitchFamily="18"/>
-                <a:ea typeface="Times New Roman" pitchFamily="18"/>
-                <a:cs typeface="Times New Roman" pitchFamily="18"/>
-              </a:rPr>
-              <a:t>architecture and fully support the HTTP verbs like GET, POST, PUT, DELETE, </a:t>
-            </a:r>
-            <a:r>
-              <a:rPr lang="en-US" b="0" i="0" u="none" strike="noStrike" baseline="0" dirty="0" smtClean="0">
-                <a:ln>
-                  <a:noFill/>
-                </a:ln>
-                <a:solidFill>
-                  <a:srgbClr val="000000"/>
-                </a:solidFill>
-                <a:latin typeface="Georgia" pitchFamily="18"/>
-                <a:ea typeface="Times New Roman" pitchFamily="18"/>
-                <a:cs typeface="Times New Roman" pitchFamily="18"/>
-              </a:rPr>
-              <a:t>PATCH </a:t>
-            </a:r>
-            <a:r>
-              <a:rPr lang="en-US" b="0" i="0" u="none" strike="noStrike" baseline="0" dirty="0" smtClean="0">
-                <a:ln>
-                  <a:noFill/>
-                </a:ln>
-                <a:solidFill>
-                  <a:srgbClr val="000000"/>
-                </a:solidFill>
-                <a:latin typeface="Georgia" pitchFamily="18"/>
-                <a:ea typeface="Times New Roman" pitchFamily="18"/>
-                <a:cs typeface="Times New Roman" pitchFamily="18"/>
-              </a:rPr>
-              <a:t>and MERGE.</a:t>
+              <a:t>- It is based on REST architecture and fully support the HTTP verbs like GET, POST, PUT, DELETE, PATCH and MERGE.</a:t>
             </a:r>
           </a:p>
           <a:p>
@@ -14523,33 +16167,8 @@
                 <a:ea typeface="Times New Roman" pitchFamily="18"/>
                 <a:cs typeface="Times New Roman" pitchFamily="18"/>
               </a:rPr>
-              <a:t>- It is platform and language </a:t>
-            </a:r>
-            <a:r>
-              <a:rPr lang="en-US" b="0" i="0" u="none" strike="noStrike" baseline="0" dirty="0" smtClean="0">
-                <a:ln>
-                  <a:noFill/>
-                </a:ln>
-                <a:solidFill>
-                  <a:srgbClr val="000000"/>
-                </a:solidFill>
-                <a:latin typeface="Georgia" pitchFamily="18"/>
-                <a:ea typeface="Times New Roman" pitchFamily="18"/>
-                <a:cs typeface="Times New Roman" pitchFamily="18"/>
-              </a:rPr>
-              <a:t>independent</a:t>
-            </a:r>
-            <a:endParaRPr lang="en-US" b="0" i="0" u="none" strike="noStrike" baseline="0" dirty="0" smtClean="0">
-              <a:ln>
-                <a:noFill/>
-              </a:ln>
-              <a:solidFill>
-                <a:srgbClr val="000000"/>
-              </a:solidFill>
-              <a:latin typeface="Georgia" pitchFamily="18"/>
-              <a:ea typeface="Times New Roman" pitchFamily="18"/>
-              <a:cs typeface="Times New Roman" pitchFamily="18"/>
-            </a:endParaRPr>
+              <a:t>- It is platform and language independent</a:t>
+            </a:r>
           </a:p>
           <a:p>
             <a:pPr marL="0" lvl="0" indent="0" hangingPunct="0">
@@ -14835,6 +16454,47 @@
           </a:p>
         </p:txBody>
       </p:sp>
+      <p:pic>
+        <p:nvPicPr>
+          <p:cNvPr id="4" name="Picture 2" descr="https://s-media-cache-ak0.pinimg.com/736x/58/df/35/58df3549ac4993bc85b985d37e5b3e24.jpg"/>
+          <p:cNvPicPr>
+            <a:picLocks noChangeAspect="1" noChangeArrowheads="1"/>
+          </p:cNvPicPr>
+          <p:nvPr/>
+        </p:nvPicPr>
+        <p:blipFill>
+          <a:blip r:embed="rId2" cstate="print">
+            <a:extLst>
+              <a:ext uri="{28A0092B-C50C-407E-A947-70E740481C1C}">
+                <a14:useLocalDpi xmlns:a14="http://schemas.microsoft.com/office/drawing/2010/main" val="0"/>
+              </a:ext>
+            </a:extLst>
+          </a:blip>
+          <a:srcRect/>
+          <a:stretch>
+            <a:fillRect/>
+          </a:stretch>
+        </p:blipFill>
+        <p:spPr bwMode="auto">
+          <a:xfrm>
+            <a:off x="9708106" y="4683014"/>
+            <a:ext cx="1774210" cy="1685018"/>
+          </a:xfrm>
+          <a:prstGeom prst="rect">
+            <a:avLst/>
+          </a:prstGeom>
+          <a:noFill/>
+          <a:extLst>
+            <a:ext uri="{909E8E84-426E-40DD-AFC4-6F175D3DCCD1}">
+              <a14:hiddenFill xmlns:a14="http://schemas.microsoft.com/office/drawing/2010/main">
+                <a:solidFill>
+                  <a:srgbClr val="FFFFFF"/>
+                </a:solidFill>
+              </a14:hiddenFill>
+            </a:ext>
+          </a:extLst>
+        </p:spPr>
+      </p:pic>
     </p:spTree>
     <p:extLst>
       <p:ext uri="{BB962C8B-B14F-4D97-AF65-F5344CB8AC3E}">
@@ -15423,6 +17083,47 @@
           </a:p>
         </p:txBody>
       </p:sp>
+      <p:pic>
+        <p:nvPicPr>
+          <p:cNvPr id="4" name="Picture 2" descr="https://s-media-cache-ak0.pinimg.com/736x/58/df/35/58df3549ac4993bc85b985d37e5b3e24.jpg"/>
+          <p:cNvPicPr>
+            <a:picLocks noChangeAspect="1" noChangeArrowheads="1"/>
+          </p:cNvPicPr>
+          <p:nvPr/>
+        </p:nvPicPr>
+        <p:blipFill>
+          <a:blip r:embed="rId2" cstate="print">
+            <a:extLst>
+              <a:ext uri="{28A0092B-C50C-407E-A947-70E740481C1C}">
+                <a14:useLocalDpi xmlns:a14="http://schemas.microsoft.com/office/drawing/2010/main" val="0"/>
+              </a:ext>
+            </a:extLst>
+          </a:blip>
+          <a:srcRect/>
+          <a:stretch>
+            <a:fillRect/>
+          </a:stretch>
+        </p:blipFill>
+        <p:spPr bwMode="auto">
+          <a:xfrm>
+            <a:off x="10058400" y="5670"/>
+            <a:ext cx="1774210" cy="1685018"/>
+          </a:xfrm>
+          <a:prstGeom prst="rect">
+            <a:avLst/>
+          </a:prstGeom>
+          <a:noFill/>
+          <a:extLst>
+            <a:ext uri="{909E8E84-426E-40DD-AFC4-6F175D3DCCD1}">
+              <a14:hiddenFill xmlns:a14="http://schemas.microsoft.com/office/drawing/2010/main">
+                <a:solidFill>
+                  <a:srgbClr val="FFFFFF"/>
+                </a:solidFill>
+              </a14:hiddenFill>
+            </a:ext>
+          </a:extLst>
+        </p:spPr>
+      </p:pic>
     </p:spTree>
     <p:extLst>
       <p:ext uri="{BB962C8B-B14F-4D97-AF65-F5344CB8AC3E}">
@@ -16471,6 +18172,47 @@
           </a:p>
         </p:txBody>
       </p:sp>
+      <p:pic>
+        <p:nvPicPr>
+          <p:cNvPr id="4" name="Picture 2" descr="https://s-media-cache-ak0.pinimg.com/736x/58/df/35/58df3549ac4993bc85b985d37e5b3e24.jpg"/>
+          <p:cNvPicPr>
+            <a:picLocks noChangeAspect="1" noChangeArrowheads="1"/>
+          </p:cNvPicPr>
+          <p:nvPr/>
+        </p:nvPicPr>
+        <p:blipFill>
+          <a:blip r:embed="rId2" cstate="print">
+            <a:extLst>
+              <a:ext uri="{28A0092B-C50C-407E-A947-70E740481C1C}">
+                <a14:useLocalDpi xmlns:a14="http://schemas.microsoft.com/office/drawing/2010/main" val="0"/>
+              </a:ext>
+            </a:extLst>
+          </a:blip>
+          <a:srcRect/>
+          <a:stretch>
+            <a:fillRect/>
+          </a:stretch>
+        </p:blipFill>
+        <p:spPr bwMode="auto">
+          <a:xfrm>
+            <a:off x="9730853" y="583514"/>
+            <a:ext cx="1774210" cy="1685018"/>
+          </a:xfrm>
+          <a:prstGeom prst="rect">
+            <a:avLst/>
+          </a:prstGeom>
+          <a:noFill/>
+          <a:extLst>
+            <a:ext uri="{909E8E84-426E-40DD-AFC4-6F175D3DCCD1}">
+              <a14:hiddenFill xmlns:a14="http://schemas.microsoft.com/office/drawing/2010/main">
+                <a:solidFill>
+                  <a:srgbClr val="FFFFFF"/>
+                </a:solidFill>
+              </a14:hiddenFill>
+            </a:ext>
+          </a:extLst>
+        </p:spPr>
+      </p:pic>
     </p:spTree>
     <p:extLst>
       <p:ext uri="{BB962C8B-B14F-4D97-AF65-F5344CB8AC3E}">

</xml_diff>